<commit_message>
Dodge and stack in data-viz-02
</commit_message>
<xml_diff>
--- a/data-viz-02/component/fundamentals.pptx
+++ b/data-viz-02/component/fundamentals.pptx
@@ -19537,6 +19537,25 @@
 )</a:t>
             </a:r>
           </a:p>
+          <a:p>
+            <a:pPr lvl="1"/>
+            <a:r>
+              <a:rPr/>
+              <a:t>R code</a:t>
+            </a:r>
+          </a:p>
+          <a:p>
+            <a:pPr lvl="0" marL="1270000" indent="0">
+              <a:buNone/>
+            </a:pPr>
+            <a:r>
+              <a:rPr sz="1800">
+                <a:latin typeface="Courier"/>
+              </a:rPr>
+              <a:t>ggplot(titanic, aes(x=pclass, fill=sex)) +
+  geom_bar(position="stack")</a:t>
+            </a:r>
+          </a:p>
         </p:txBody>
       </p:sp>
     </p:spTree>
@@ -19605,7 +19624,31 @@
             </a:r>
             <a:r>
               <a:rPr/>
-              <a:t>stack</a:t>
+              <a:t>output</a:t>
+            </a:r>
+            <a:r>
+              <a:rPr/>
+              <a:t> </a:t>
+            </a:r>
+            <a:r>
+              <a:rPr/>
+              <a:t>for</a:t>
+            </a:r>
+            <a:r>
+              <a:rPr/>
+              <a:t> </a:t>
+            </a:r>
+            <a:r>
+              <a:rPr/>
+              <a:t>stacked</a:t>
+            </a:r>
+            <a:r>
+              <a:rPr/>
+              <a:t> </a:t>
+            </a:r>
+            <a:r>
+              <a:rPr/>
+              <a:t>bars</a:t>
             </a:r>
           </a:p>
         </p:txBody>
@@ -19885,14 +19928,14 @@
             </a:r>
             <a:r>
               <a:rPr/>
-              <a:t>dodge</a:t>
+              <a:t>stack</a:t>
             </a:r>
           </a:p>
         </p:txBody>
       </p:sp>
       <p:pic>
         <p:nvPicPr>
-          <p:cNvPr descr="../images/r/count-by-dodge.png" id="0" name="Picture 1"/>
+          <p:cNvPr descr="../images/r/count-by-stack.png" id="0" name="Picture 1"/>
           <p:cNvPicPr>
             <a:picLocks noGrp="1" noChangeAspect="1"/>
           </p:cNvPicPr>
@@ -19986,14 +20029,14 @@
             </a:r>
             <a:r>
               <a:rPr/>
-              <a:t>stack</a:t>
+              <a:t>dodge</a:t>
             </a:r>
           </a:p>
         </p:txBody>
       </p:sp>
       <p:pic>
         <p:nvPicPr>
-          <p:cNvPr descr="../images/r/count-by-stack.png" id="0" name="Picture 1"/>
+          <p:cNvPr descr="../images/r/count-by-dodge.png" id="0" name="Picture 1"/>
           <p:cNvPicPr>
             <a:picLocks noGrp="1" noChangeAspect="1"/>
           </p:cNvPicPr>

</xml_diff>

<commit_message>
Work on recommendations in data-viz-02.
</commit_message>
<xml_diff>
--- a/data-viz-02/component/fundamentals.pptx
+++ b/data-viz-02/component/fundamentals.pptx
@@ -5,7 +5,7 @@
     <p:sldMasterId id="2147483648" r:id="rId1"/>
   </p:sldMasterIdLst>
   <p:notesMasterIdLst>
-    <p:NotesMasterId r:id="rId65"/>
+    <p:NotesMasterId r:id="rId59"/>
   </p:notesMasterIdLst>
   <p:sldIdLst>
     <p:sldId id="256" r:id="rId2"/>
@@ -65,12 +65,6 @@
     <p:sldId id="310" r:id="rId56"/>
     <p:sldId id="311" r:id="rId57"/>
     <p:sldId id="312" r:id="rId58"/>
-    <p:sldId id="313" r:id="rId59"/>
-    <p:sldId id="314" r:id="rId60"/>
-    <p:sldId id="315" r:id="rId61"/>
-    <p:sldId id="316" r:id="rId62"/>
-    <p:sldId id="317" r:id="rId63"/>
-    <p:sldId id="318" r:id="rId64"/>
   </p:sldIdLst>
   <p:sldSz cx="9144000" cy="6858000" type="screen4x3"/>
   <p:notesSz cx="6858000" cy="9144000"/>
@@ -8255,7 +8249,7 @@
           <a:p>
             <a:fld id="{18BDFEC3-8487-43E8-A154-7C12CBC1FFF2}" type="slidenum">
               <a:rPr lang="en-US"/>
-              <a:t>40</a:t>
+              <a:t>39</a:t>
             </a:fld>
             <a:endParaRPr lang="en-US"/>
           </a:p>
@@ -8933,7 +8927,7 @@
           <a:p>
             <a:fld id="{18BDFEC3-8487-43E8-A154-7C12CBC1FFF2}" type="slidenum">
               <a:rPr lang="en-US"/>
-              <a:t>41</a:t>
+              <a:t>40</a:t>
             </a:fld>
             <a:endParaRPr lang="en-US"/>
           </a:p>
@@ -9079,7 +9073,7 @@
           <a:p>
             <a:fld id="{18BDFEC3-8487-43E8-A154-7C12CBC1FFF2}" type="slidenum">
               <a:rPr lang="en-US"/>
-              <a:t>42</a:t>
+              <a:t>41</a:t>
             </a:fld>
             <a:endParaRPr lang="en-US"/>
           </a:p>
@@ -9241,7 +9235,7 @@
           <a:p>
             <a:fld id="{18BDFEC3-8487-43E8-A154-7C12CBC1FFF2}" type="slidenum">
               <a:rPr lang="en-US"/>
-              <a:t>43</a:t>
+              <a:t>42</a:t>
             </a:fld>
             <a:endParaRPr lang="en-US"/>
           </a:p>
@@ -9563,7 +9557,7 @@
           <a:p>
             <a:fld id="{18BDFEC3-8487-43E8-A154-7C12CBC1FFF2}" type="slidenum">
               <a:rPr lang="en-US"/>
-              <a:t>44</a:t>
+              <a:t>43</a:t>
             </a:fld>
             <a:endParaRPr lang="en-US"/>
           </a:p>
@@ -9709,7 +9703,7 @@
           <a:p>
             <a:fld id="{18BDFEC3-8487-43E8-A154-7C12CBC1FFF2}" type="slidenum">
               <a:rPr lang="en-US"/>
-              <a:t>45</a:t>
+              <a:t>44</a:t>
             </a:fld>
             <a:endParaRPr lang="en-US"/>
           </a:p>
@@ -10389,7 +10383,7 @@
           <a:p>
             <a:fld id="{18BDFEC3-8487-43E8-A154-7C12CBC1FFF2}" type="slidenum">
               <a:rPr lang="en-US"/>
-              <a:t>46</a:t>
+              <a:t>45</a:t>
             </a:fld>
             <a:endParaRPr lang="en-US"/>
           </a:p>
@@ -10449,15 +10443,15 @@
             </a:pPr>
             <a:r>
               <a:rPr/>
-              <a:t>All</a:t>
-            </a:r>
-            <a:r>
-              <a:rPr/>
-              <a:t> </a:t>
-            </a:r>
-            <a:r>
-              <a:rPr/>
-              <a:t>of</a:t>
+              <a:t>Here</a:t>
+            </a:r>
+            <a:r>
+              <a:rPr/>
+              <a:t> </a:t>
+            </a:r>
+            <a:r>
+              <a:rPr/>
+              <a:t>is</a:t>
             </a:r>
             <a:r>
               <a:rPr/>
@@ -10473,87 +10467,39 @@
             </a:r>
             <a:r>
               <a:rPr/>
-              <a:t>examples,</a:t>
-            </a:r>
-            <a:r>
-              <a:rPr/>
-              <a:t> </a:t>
-            </a:r>
-            <a:r>
-              <a:rPr/>
-              <a:t>so</a:t>
-            </a:r>
-            <a:r>
-              <a:rPr/>
-              <a:t> </a:t>
-            </a:r>
-            <a:r>
-              <a:rPr/>
-              <a:t>far,</a:t>
-            </a:r>
-            <a:r>
-              <a:rPr/>
-              <a:t> </a:t>
-            </a:r>
-            <a:r>
-              <a:rPr/>
-              <a:t>have</a:t>
-            </a:r>
-            <a:r>
-              <a:rPr/>
-              <a:t> </a:t>
-            </a:r>
-            <a:r>
-              <a:rPr/>
-              <a:t>used</a:t>
-            </a:r>
-            <a:r>
-              <a:rPr/>
-              <a:t> </a:t>
-            </a:r>
-            <a:r>
-              <a:rPr/>
-              <a:t>counts</a:t>
-            </a:r>
-            <a:r>
-              <a:rPr/>
-              <a:t> </a:t>
-            </a:r>
-            <a:r>
-              <a:rPr/>
-              <a:t>in</a:t>
-            </a:r>
-            <a:r>
-              <a:rPr/>
-              <a:t> </a:t>
-            </a:r>
-            <a:r>
-              <a:rPr/>
-              <a:t>the</a:t>
-            </a:r>
-            <a:r>
-              <a:rPr/>
-              <a:t> </a:t>
-            </a:r>
-            <a:r>
-              <a:rPr/>
-              <a:t>bar</a:t>
-            </a:r>
-            <a:r>
-              <a:rPr/>
-              <a:t> </a:t>
-            </a:r>
-            <a:r>
-              <a:rPr/>
-              <a:t>chart.</a:t>
-            </a:r>
-            <a:r>
-              <a:rPr/>
-              <a:t> </a:t>
-            </a:r>
-            <a:r>
-              <a:rPr/>
-              <a:t>There</a:t>
+              <a:t>Python</a:t>
+            </a:r>
+            <a:r>
+              <a:rPr/>
+              <a:t> </a:t>
+            </a:r>
+            <a:r>
+              <a:rPr/>
+              <a:t>code.</a:t>
+            </a:r>
+            <a:r>
+              <a:rPr/>
+              <a:t> </a:t>
+            </a:r>
+            <a:r>
+              <a:rPr/>
+              <a:t>Notice</a:t>
+            </a:r>
+            <a:r>
+              <a:rPr/>
+              <a:t> </a:t>
+            </a:r>
+            <a:r>
+              <a:rPr/>
+              <a:t>that</a:t>
+            </a:r>
+            <a:r>
+              <a:rPr/>
+              <a:t> </a:t>
+            </a:r>
+            <a:r>
+              <a:rPr/>
+              <a:t>there</a:t>
             </a:r>
             <a:r>
               <a:rPr/>
@@ -10569,111 +10515,23 @@
             </a:r>
             <a:r>
               <a:rPr/>
-              <a:t>many</a:t>
-            </a:r>
-            <a:r>
-              <a:rPr/>
-              <a:t> </a:t>
-            </a:r>
-            <a:r>
-              <a:rPr/>
-              <a:t>other</a:t>
-            </a:r>
-            <a:r>
-              <a:rPr/>
-              <a:t> </a:t>
-            </a:r>
-            <a:r>
-              <a:rPr/>
-              <a:t>statistics</a:t>
-            </a:r>
-            <a:r>
-              <a:rPr/>
-              <a:t> </a:t>
-            </a:r>
-            <a:r>
-              <a:rPr/>
-              <a:t>that</a:t>
-            </a:r>
-            <a:r>
-              <a:rPr/>
-              <a:t> </a:t>
-            </a:r>
-            <a:r>
-              <a:rPr/>
-              <a:t>you</a:t>
-            </a:r>
-            <a:r>
-              <a:rPr/>
-              <a:t> </a:t>
-            </a:r>
-            <a:r>
-              <a:rPr/>
-              <a:t>can</a:t>
-            </a:r>
-            <a:r>
-              <a:rPr/>
-              <a:t> </a:t>
-            </a:r>
-            <a:r>
-              <a:rPr/>
-              <a:t>choose</a:t>
-            </a:r>
-            <a:r>
-              <a:rPr/>
-              <a:t> </a:t>
-            </a:r>
-            <a:r>
-              <a:rPr/>
-              <a:t>from,</a:t>
-            </a:r>
-            <a:r>
-              <a:rPr/>
-              <a:t> </a:t>
-            </a:r>
-            <a:r>
-              <a:rPr/>
-              <a:t>and</a:t>
-            </a:r>
-            <a:r>
-              <a:rPr/>
-              <a:t> </a:t>
-            </a:r>
-            <a:r>
-              <a:rPr/>
-              <a:t>the</a:t>
-            </a:r>
-            <a:r>
-              <a:rPr/>
-              <a:t> </a:t>
-            </a:r>
-            <a:r>
-              <a:rPr/>
-              <a:t>trickiest,</a:t>
-            </a:r>
-            <a:r>
-              <a:rPr/>
-              <a:t> </a:t>
-            </a:r>
-            <a:r>
-              <a:rPr/>
-              <a:t>surprisingly,</a:t>
-            </a:r>
-            <a:r>
-              <a:rPr/>
-              <a:t> </a:t>
-            </a:r>
-            <a:r>
-              <a:rPr/>
-              <a:t>is</a:t>
-            </a:r>
-            <a:r>
-              <a:rPr/>
-              <a:t> </a:t>
-            </a:r>
-            <a:r>
-              <a:rPr/>
-              <a:t>percentage.</a:t>
+              <a:t>two</a:t>
+            </a:r>
+            <a:r>
+              <a:rPr/>
+              <a:t> </a:t>
+            </a:r>
+            <a:r>
+              <a:rPr/>
+              <a:t>different</a:t>
+            </a:r>
+            <a:r>
+              <a:rPr/>
+              <a:t> </a:t>
+            </a:r>
+            <a:r>
+              <a:rPr/>
+              <a:t>approaches.</a:t>
             </a:r>
           </a:p>
         </p:txBody>
@@ -10695,7 +10553,7 @@
           <a:p>
             <a:fld id="{18BDFEC3-8487-43E8-A154-7C12CBC1FFF2}" type="slidenum">
               <a:rPr lang="en-US"/>
-              <a:t>55</a:t>
+              <a:t>46</a:t>
             </a:fld>
             <a:endParaRPr lang="en-US"/>
           </a:p>
@@ -11456,6 +11314,770 @@
             <a:fld id="{18BDFEC3-8487-43E8-A154-7C12CBC1FFF2}" type="slidenum">
               <a:rPr lang="en-US"/>
               <a:t>4</a:t>
+            </a:fld>
+            <a:endParaRPr lang="en-US"/>
+          </a:p>
+        </p:txBody>
+      </p:sp>
+    </p:spTree>
+  </p:cSld>
+</p:notes>
+</file>
+
+<file path=ppt/notesSlides/notesSlide30.xml><?xml version="1.0" encoding="utf-8"?>
+<p:notes xmlns:a="http://schemas.openxmlformats.org/drawingml/2006/main" xmlns:r="http://schemas.openxmlformats.org/officeDocument/2006/relationships" xmlns:p="http://schemas.openxmlformats.org/presentationml/2006/main">
+  <p:cSld>
+    <p:spTree>
+      <p:nvGrpSpPr>
+        <p:cNvPr id="1" name=""/>
+        <p:cNvGrpSpPr/>
+        <p:nvPr/>
+      </p:nvGrpSpPr>
+      <p:grpSpPr>
+        <a:xfrm>
+          <a:off x="0" y="0"/>
+          <a:ext cx="0" cy="0"/>
+          <a:chOff x="0" y="0"/>
+          <a:chExt cx="0" cy="0"/>
+        </a:xfrm>
+      </p:grpSpPr>
+      <p:sp>
+        <p:nvSpPr>
+          <p:cNvPr id="2" name="Slide Image Placeholder 1"/>
+          <p:cNvSpPr>
+            <a:spLocks noGrp="1" noRot="1" noChangeAspect="1"/>
+          </p:cNvSpPr>
+          <p:nvPr>
+            <p:ph type="sldImg"/>
+          </p:nvPr>
+        </p:nvSpPr>
+        <p:spPr/>
+      </p:sp>
+      <p:sp>
+        <p:nvSpPr>
+          <p:cNvPr id="3" name="Notes Placeholder 2"/>
+          <p:cNvSpPr>
+            <a:spLocks noGrp="1"/>
+          </p:cNvSpPr>
+          <p:nvPr>
+            <p:ph type="body" idx="1"/>
+          </p:nvPr>
+        </p:nvSpPr>
+        <p:spPr/>
+        <p:txBody>
+          <a:bodyPr/>
+          <a:lstStyle/>
+          <a:p>
+            <a:pPr lvl="0" marL="0" indent="0">
+              <a:buNone/>
+            </a:pPr>
+            <a:r>
+              <a:rPr/>
+              <a:t>This</a:t>
+            </a:r>
+            <a:r>
+              <a:rPr/>
+              <a:t> </a:t>
+            </a:r>
+            <a:r>
+              <a:rPr/>
+              <a:t>is</a:t>
+            </a:r>
+            <a:r>
+              <a:rPr/>
+              <a:t> </a:t>
+            </a:r>
+            <a:r>
+              <a:rPr/>
+              <a:t>what</a:t>
+            </a:r>
+            <a:r>
+              <a:rPr/>
+              <a:t> </a:t>
+            </a:r>
+            <a:r>
+              <a:rPr/>
+              <a:t>the</a:t>
+            </a:r>
+            <a:r>
+              <a:rPr/>
+              <a:t> </a:t>
+            </a:r>
+            <a:r>
+              <a:rPr/>
+              <a:t>Python</a:t>
+            </a:r>
+            <a:r>
+              <a:rPr/>
+              <a:t> </a:t>
+            </a:r>
+            <a:r>
+              <a:rPr/>
+              <a:t>normalized</a:t>
+            </a:r>
+            <a:r>
+              <a:rPr/>
+              <a:t> </a:t>
+            </a:r>
+            <a:r>
+              <a:rPr/>
+              <a:t>barchart</a:t>
+            </a:r>
+            <a:r>
+              <a:rPr/>
+              <a:t> </a:t>
+            </a:r>
+            <a:r>
+              <a:rPr/>
+              <a:t>looks</a:t>
+            </a:r>
+            <a:r>
+              <a:rPr/>
+              <a:t> </a:t>
+            </a:r>
+            <a:r>
+              <a:rPr/>
+              <a:t>like.</a:t>
+            </a:r>
+          </a:p>
+        </p:txBody>
+      </p:sp>
+      <p:sp>
+        <p:nvSpPr>
+          <p:cNvPr id="4" name="Slide Number Placeholder 3"/>
+          <p:cNvSpPr>
+            <a:spLocks noGrp="1"/>
+          </p:cNvSpPr>
+          <p:nvPr>
+            <p:ph type="sldNum" sz="quarter" idx="10"/>
+          </p:nvPr>
+        </p:nvSpPr>
+        <p:spPr/>
+        <p:txBody>
+          <a:bodyPr/>
+          <a:lstStyle/>
+          <a:p>
+            <a:fld id="{18BDFEC3-8487-43E8-A154-7C12CBC1FFF2}" type="slidenum">
+              <a:rPr lang="en-US"/>
+              <a:t>47</a:t>
+            </a:fld>
+            <a:endParaRPr lang="en-US"/>
+          </a:p>
+        </p:txBody>
+      </p:sp>
+    </p:spTree>
+  </p:cSld>
+</p:notes>
+</file>
+
+<file path=ppt/notesSlides/notesSlide31.xml><?xml version="1.0" encoding="utf-8"?>
+<p:notes xmlns:a="http://schemas.openxmlformats.org/drawingml/2006/main" xmlns:r="http://schemas.openxmlformats.org/officeDocument/2006/relationships" xmlns:p="http://schemas.openxmlformats.org/presentationml/2006/main">
+  <p:cSld>
+    <p:spTree>
+      <p:nvGrpSpPr>
+        <p:cNvPr id="1" name=""/>
+        <p:cNvGrpSpPr/>
+        <p:nvPr/>
+      </p:nvGrpSpPr>
+      <p:grpSpPr>
+        <a:xfrm>
+          <a:off x="0" y="0"/>
+          <a:ext cx="0" cy="0"/>
+          <a:chOff x="0" y="0"/>
+          <a:chExt cx="0" cy="0"/>
+        </a:xfrm>
+      </p:grpSpPr>
+      <p:sp>
+        <p:nvSpPr>
+          <p:cNvPr id="2" name="Slide Image Placeholder 1"/>
+          <p:cNvSpPr>
+            <a:spLocks noGrp="1" noRot="1" noChangeAspect="1"/>
+          </p:cNvSpPr>
+          <p:nvPr>
+            <p:ph type="sldImg"/>
+          </p:nvPr>
+        </p:nvSpPr>
+        <p:spPr/>
+      </p:sp>
+      <p:sp>
+        <p:nvSpPr>
+          <p:cNvPr id="3" name="Notes Placeholder 2"/>
+          <p:cNvSpPr>
+            <a:spLocks noGrp="1"/>
+          </p:cNvSpPr>
+          <p:nvPr>
+            <p:ph type="body" idx="1"/>
+          </p:nvPr>
+        </p:nvSpPr>
+        <p:spPr/>
+        <p:txBody>
+          <a:bodyPr/>
+          <a:lstStyle/>
+          <a:p>
+            <a:pPr lvl="0" marL="0" indent="0">
+              <a:buNone/>
+            </a:pPr>
+            <a:r>
+              <a:rPr/>
+              <a:t>This</a:t>
+            </a:r>
+            <a:r>
+              <a:rPr/>
+              <a:t> </a:t>
+            </a:r>
+            <a:r>
+              <a:rPr/>
+              <a:t>is</a:t>
+            </a:r>
+            <a:r>
+              <a:rPr/>
+              <a:t> </a:t>
+            </a:r>
+            <a:r>
+              <a:rPr/>
+              <a:t>what</a:t>
+            </a:r>
+            <a:r>
+              <a:rPr/>
+              <a:t> </a:t>
+            </a:r>
+            <a:r>
+              <a:rPr/>
+              <a:t>the</a:t>
+            </a:r>
+            <a:r>
+              <a:rPr/>
+              <a:t> </a:t>
+            </a:r>
+            <a:r>
+              <a:rPr/>
+              <a:t>alternate</a:t>
+            </a:r>
+            <a:r>
+              <a:rPr/>
+              <a:t> </a:t>
+            </a:r>
+            <a:r>
+              <a:rPr/>
+              <a:t>version</a:t>
+            </a:r>
+            <a:r>
+              <a:rPr/>
+              <a:t> </a:t>
+            </a:r>
+            <a:r>
+              <a:rPr/>
+              <a:t>of</a:t>
+            </a:r>
+            <a:r>
+              <a:rPr/>
+              <a:t> </a:t>
+            </a:r>
+            <a:r>
+              <a:rPr/>
+              <a:t>the</a:t>
+            </a:r>
+            <a:r>
+              <a:rPr/>
+              <a:t> </a:t>
+            </a:r>
+            <a:r>
+              <a:rPr/>
+              <a:t>Python</a:t>
+            </a:r>
+            <a:r>
+              <a:rPr/>
+              <a:t> </a:t>
+            </a:r>
+            <a:r>
+              <a:rPr/>
+              <a:t>normalized</a:t>
+            </a:r>
+            <a:r>
+              <a:rPr/>
+              <a:t> </a:t>
+            </a:r>
+            <a:r>
+              <a:rPr/>
+              <a:t>barchart.</a:t>
+            </a:r>
+          </a:p>
+        </p:txBody>
+      </p:sp>
+      <p:sp>
+        <p:nvSpPr>
+          <p:cNvPr id="4" name="Slide Number Placeholder 3"/>
+          <p:cNvSpPr>
+            <a:spLocks noGrp="1"/>
+          </p:cNvSpPr>
+          <p:nvPr>
+            <p:ph type="sldNum" sz="quarter" idx="10"/>
+          </p:nvPr>
+        </p:nvSpPr>
+        <p:spPr/>
+        <p:txBody>
+          <a:bodyPr/>
+          <a:lstStyle/>
+          <a:p>
+            <a:fld id="{18BDFEC3-8487-43E8-A154-7C12CBC1FFF2}" type="slidenum">
+              <a:rPr lang="en-US"/>
+              <a:t>48</a:t>
+            </a:fld>
+            <a:endParaRPr lang="en-US"/>
+          </a:p>
+        </p:txBody>
+      </p:sp>
+    </p:spTree>
+  </p:cSld>
+</p:notes>
+</file>
+
+<file path=ppt/notesSlides/notesSlide32.xml><?xml version="1.0" encoding="utf-8"?>
+<p:notes xmlns:a="http://schemas.openxmlformats.org/drawingml/2006/main" xmlns:r="http://schemas.openxmlformats.org/officeDocument/2006/relationships" xmlns:p="http://schemas.openxmlformats.org/presentationml/2006/main">
+  <p:cSld>
+    <p:spTree>
+      <p:nvGrpSpPr>
+        <p:cNvPr id="1" name=""/>
+        <p:cNvGrpSpPr/>
+        <p:nvPr/>
+      </p:nvGrpSpPr>
+      <p:grpSpPr>
+        <a:xfrm>
+          <a:off x="0" y="0"/>
+          <a:ext cx="0" cy="0"/>
+          <a:chOff x="0" y="0"/>
+          <a:chExt cx="0" cy="0"/>
+        </a:xfrm>
+      </p:grpSpPr>
+      <p:sp>
+        <p:nvSpPr>
+          <p:cNvPr id="2" name="Slide Image Placeholder 1"/>
+          <p:cNvSpPr>
+            <a:spLocks noGrp="1" noRot="1" noChangeAspect="1"/>
+          </p:cNvSpPr>
+          <p:nvPr>
+            <p:ph type="sldImg"/>
+          </p:nvPr>
+        </p:nvSpPr>
+        <p:spPr/>
+      </p:sp>
+      <p:sp>
+        <p:nvSpPr>
+          <p:cNvPr id="3" name="Notes Placeholder 2"/>
+          <p:cNvSpPr>
+            <a:spLocks noGrp="1"/>
+          </p:cNvSpPr>
+          <p:nvPr>
+            <p:ph type="body" idx="1"/>
+          </p:nvPr>
+        </p:nvSpPr>
+        <p:spPr/>
+        <p:txBody>
+          <a:bodyPr/>
+          <a:lstStyle/>
+          <a:p>
+            <a:pPr lvl="0" marL="0" indent="0">
+              <a:buNone/>
+            </a:pPr>
+            <a:r>
+              <a:rPr/>
+              <a:t>Here</a:t>
+            </a:r>
+            <a:r>
+              <a:rPr/>
+              <a:t> </a:t>
+            </a:r>
+            <a:r>
+              <a:rPr/>
+              <a:t>is</a:t>
+            </a:r>
+            <a:r>
+              <a:rPr/>
+              <a:t> </a:t>
+            </a:r>
+            <a:r>
+              <a:rPr/>
+              <a:t>the</a:t>
+            </a:r>
+            <a:r>
+              <a:rPr/>
+              <a:t> </a:t>
+            </a:r>
+            <a:r>
+              <a:rPr/>
+              <a:t>R</a:t>
+            </a:r>
+            <a:r>
+              <a:rPr/>
+              <a:t> </a:t>
+            </a:r>
+            <a:r>
+              <a:rPr/>
+              <a:t>output.</a:t>
+            </a:r>
+          </a:p>
+        </p:txBody>
+      </p:sp>
+      <p:sp>
+        <p:nvSpPr>
+          <p:cNvPr id="4" name="Slide Number Placeholder 3"/>
+          <p:cNvSpPr>
+            <a:spLocks noGrp="1"/>
+          </p:cNvSpPr>
+          <p:nvPr>
+            <p:ph type="sldNum" sz="quarter" idx="10"/>
+          </p:nvPr>
+        </p:nvSpPr>
+        <p:spPr/>
+        <p:txBody>
+          <a:bodyPr/>
+          <a:lstStyle/>
+          <a:p>
+            <a:fld id="{18BDFEC3-8487-43E8-A154-7C12CBC1FFF2}" type="slidenum">
+              <a:rPr lang="en-US"/>
+              <a:t>50</a:t>
+            </a:fld>
+            <a:endParaRPr lang="en-US"/>
+          </a:p>
+        </p:txBody>
+      </p:sp>
+    </p:spTree>
+  </p:cSld>
+</p:notes>
+</file>
+
+<file path=ppt/notesSlides/notesSlide33.xml><?xml version="1.0" encoding="utf-8"?>
+<p:notes xmlns:a="http://schemas.openxmlformats.org/drawingml/2006/main" xmlns:r="http://schemas.openxmlformats.org/officeDocument/2006/relationships" xmlns:p="http://schemas.openxmlformats.org/presentationml/2006/main">
+  <p:cSld>
+    <p:spTree>
+      <p:nvGrpSpPr>
+        <p:cNvPr id="1" name=""/>
+        <p:cNvGrpSpPr/>
+        <p:nvPr/>
+      </p:nvGrpSpPr>
+      <p:grpSpPr>
+        <a:xfrm>
+          <a:off x="0" y="0"/>
+          <a:ext cx="0" cy="0"/>
+          <a:chOff x="0" y="0"/>
+          <a:chExt cx="0" cy="0"/>
+        </a:xfrm>
+      </p:grpSpPr>
+      <p:sp>
+        <p:nvSpPr>
+          <p:cNvPr id="2" name="Slide Image Placeholder 1"/>
+          <p:cNvSpPr>
+            <a:spLocks noGrp="1" noRot="1" noChangeAspect="1"/>
+          </p:cNvSpPr>
+          <p:nvPr>
+            <p:ph type="sldImg"/>
+          </p:nvPr>
+        </p:nvSpPr>
+        <p:spPr/>
+      </p:sp>
+      <p:sp>
+        <p:nvSpPr>
+          <p:cNvPr id="3" name="Notes Placeholder 2"/>
+          <p:cNvSpPr>
+            <a:spLocks noGrp="1"/>
+          </p:cNvSpPr>
+          <p:nvPr>
+            <p:ph type="body" idx="1"/>
+          </p:nvPr>
+        </p:nvSpPr>
+        <p:spPr/>
+        <p:txBody>
+          <a:bodyPr/>
+          <a:lstStyle/>
+          <a:p>
+            <a:pPr lvl="0" marL="0" indent="0">
+              <a:buNone/>
+            </a:pPr>
+            <a:r>
+              <a:rPr/>
+              <a:t>Here</a:t>
+            </a:r>
+            <a:r>
+              <a:rPr/>
+              <a:t> </a:t>
+            </a:r>
+            <a:r>
+              <a:rPr/>
+              <a:t>is</a:t>
+            </a:r>
+            <a:r>
+              <a:rPr/>
+              <a:t> </a:t>
+            </a:r>
+            <a:r>
+              <a:rPr/>
+              <a:t>the</a:t>
+            </a:r>
+            <a:r>
+              <a:rPr/>
+              <a:t> </a:t>
+            </a:r>
+            <a:r>
+              <a:rPr/>
+              <a:t>alternate</a:t>
+            </a:r>
+            <a:r>
+              <a:rPr/>
+              <a:t> </a:t>
+            </a:r>
+            <a:r>
+              <a:rPr/>
+              <a:t>version.</a:t>
+            </a:r>
+          </a:p>
+        </p:txBody>
+      </p:sp>
+      <p:sp>
+        <p:nvSpPr>
+          <p:cNvPr id="4" name="Slide Number Placeholder 3"/>
+          <p:cNvSpPr>
+            <a:spLocks noGrp="1"/>
+          </p:cNvSpPr>
+          <p:nvPr>
+            <p:ph type="sldNum" sz="quarter" idx="10"/>
+          </p:nvPr>
+        </p:nvSpPr>
+        <p:spPr/>
+        <p:txBody>
+          <a:bodyPr/>
+          <a:lstStyle/>
+          <a:p>
+            <a:fld id="{18BDFEC3-8487-43E8-A154-7C12CBC1FFF2}" type="slidenum">
+              <a:rPr lang="en-US"/>
+              <a:t>51</a:t>
+            </a:fld>
+            <a:endParaRPr lang="en-US"/>
+          </a:p>
+        </p:txBody>
+      </p:sp>
+    </p:spTree>
+  </p:cSld>
+</p:notes>
+</file>
+
+<file path=ppt/notesSlides/notesSlide34.xml><?xml version="1.0" encoding="utf-8"?>
+<p:notes xmlns:a="http://schemas.openxmlformats.org/drawingml/2006/main" xmlns:r="http://schemas.openxmlformats.org/officeDocument/2006/relationships" xmlns:p="http://schemas.openxmlformats.org/presentationml/2006/main">
+  <p:cSld>
+    <p:spTree>
+      <p:nvGrpSpPr>
+        <p:cNvPr id="1" name=""/>
+        <p:cNvGrpSpPr/>
+        <p:nvPr/>
+      </p:nvGrpSpPr>
+      <p:grpSpPr>
+        <a:xfrm>
+          <a:off x="0" y="0"/>
+          <a:ext cx="0" cy="0"/>
+          <a:chOff x="0" y="0"/>
+          <a:chExt cx="0" cy="0"/>
+        </a:xfrm>
+      </p:grpSpPr>
+      <p:sp>
+        <p:nvSpPr>
+          <p:cNvPr id="2" name="Slide Image Placeholder 1"/>
+          <p:cNvSpPr>
+            <a:spLocks noGrp="1" noRot="1" noChangeAspect="1"/>
+          </p:cNvSpPr>
+          <p:nvPr>
+            <p:ph type="sldImg"/>
+          </p:nvPr>
+        </p:nvSpPr>
+        <p:spPr/>
+      </p:sp>
+      <p:sp>
+        <p:nvSpPr>
+          <p:cNvPr id="3" name="Notes Placeholder 2"/>
+          <p:cNvSpPr>
+            <a:spLocks noGrp="1"/>
+          </p:cNvSpPr>
+          <p:nvPr>
+            <p:ph type="body" idx="1"/>
+          </p:nvPr>
+        </p:nvSpPr>
+        <p:spPr/>
+        <p:txBody>
+          <a:bodyPr/>
+          <a:lstStyle/>
+          <a:p>
+            <a:pPr lvl="0" marL="0" indent="0">
+              <a:buNone/>
+            </a:pPr>
+            <a:r>
+              <a:rPr/>
+              <a:t>Here</a:t>
+            </a:r>
+            <a:r>
+              <a:rPr/>
+              <a:t> </a:t>
+            </a:r>
+            <a:r>
+              <a:rPr/>
+              <a:t>is</a:t>
+            </a:r>
+            <a:r>
+              <a:rPr/>
+              <a:t> </a:t>
+            </a:r>
+            <a:r>
+              <a:rPr/>
+              <a:t>the</a:t>
+            </a:r>
+            <a:r>
+              <a:rPr/>
+              <a:t> </a:t>
+            </a:r>
+            <a:r>
+              <a:rPr/>
+              <a:t>Tableau</a:t>
+            </a:r>
+            <a:r>
+              <a:rPr/>
+              <a:t> </a:t>
+            </a:r>
+            <a:r>
+              <a:rPr/>
+              <a:t>output.</a:t>
+            </a:r>
+          </a:p>
+        </p:txBody>
+      </p:sp>
+      <p:sp>
+        <p:nvSpPr>
+          <p:cNvPr id="4" name="Slide Number Placeholder 3"/>
+          <p:cNvSpPr>
+            <a:spLocks noGrp="1"/>
+          </p:cNvSpPr>
+          <p:nvPr>
+            <p:ph type="sldNum" sz="quarter" idx="10"/>
+          </p:nvPr>
+        </p:nvSpPr>
+        <p:spPr/>
+        <p:txBody>
+          <a:bodyPr/>
+          <a:lstStyle/>
+          <a:p>
+            <a:fld id="{18BDFEC3-8487-43E8-A154-7C12CBC1FFF2}" type="slidenum">
+              <a:rPr lang="en-US"/>
+              <a:t>52</a:t>
+            </a:fld>
+            <a:endParaRPr lang="en-US"/>
+          </a:p>
+        </p:txBody>
+      </p:sp>
+    </p:spTree>
+  </p:cSld>
+</p:notes>
+</file>
+
+<file path=ppt/notesSlides/notesSlide35.xml><?xml version="1.0" encoding="utf-8"?>
+<p:notes xmlns:a="http://schemas.openxmlformats.org/drawingml/2006/main" xmlns:r="http://schemas.openxmlformats.org/officeDocument/2006/relationships" xmlns:p="http://schemas.openxmlformats.org/presentationml/2006/main">
+  <p:cSld>
+    <p:spTree>
+      <p:nvGrpSpPr>
+        <p:cNvPr id="1" name=""/>
+        <p:cNvGrpSpPr/>
+        <p:nvPr/>
+      </p:nvGrpSpPr>
+      <p:grpSpPr>
+        <a:xfrm>
+          <a:off x="0" y="0"/>
+          <a:ext cx="0" cy="0"/>
+          <a:chOff x="0" y="0"/>
+          <a:chExt cx="0" cy="0"/>
+        </a:xfrm>
+      </p:grpSpPr>
+      <p:sp>
+        <p:nvSpPr>
+          <p:cNvPr id="2" name="Slide Image Placeholder 1"/>
+          <p:cNvSpPr>
+            <a:spLocks noGrp="1" noRot="1" noChangeAspect="1"/>
+          </p:cNvSpPr>
+          <p:nvPr>
+            <p:ph type="sldImg"/>
+          </p:nvPr>
+        </p:nvSpPr>
+        <p:spPr/>
+      </p:sp>
+      <p:sp>
+        <p:nvSpPr>
+          <p:cNvPr id="3" name="Notes Placeholder 2"/>
+          <p:cNvSpPr>
+            <a:spLocks noGrp="1"/>
+          </p:cNvSpPr>
+          <p:nvPr>
+            <p:ph type="body" idx="1"/>
+          </p:nvPr>
+        </p:nvSpPr>
+        <p:spPr/>
+        <p:txBody>
+          <a:bodyPr/>
+          <a:lstStyle/>
+          <a:p>
+            <a:pPr lvl="0" marL="0" indent="0">
+              <a:buNone/>
+            </a:pPr>
+            <a:r>
+              <a:rPr/>
+              <a:t>Here</a:t>
+            </a:r>
+            <a:r>
+              <a:rPr/>
+              <a:t> </a:t>
+            </a:r>
+            <a:r>
+              <a:rPr/>
+              <a:t>is</a:t>
+            </a:r>
+            <a:r>
+              <a:rPr/>
+              <a:t> </a:t>
+            </a:r>
+            <a:r>
+              <a:rPr/>
+              <a:t>the</a:t>
+            </a:r>
+            <a:r>
+              <a:rPr/>
+              <a:t> </a:t>
+            </a:r>
+            <a:r>
+              <a:rPr/>
+              <a:t>alternate</a:t>
+            </a:r>
+            <a:r>
+              <a:rPr/>
+              <a:t> </a:t>
+            </a:r>
+            <a:r>
+              <a:rPr/>
+              <a:t>version.</a:t>
+            </a:r>
+          </a:p>
+        </p:txBody>
+      </p:sp>
+      <p:sp>
+        <p:nvSpPr>
+          <p:cNvPr id="4" name="Slide Number Placeholder 3"/>
+          <p:cNvSpPr>
+            <a:spLocks noGrp="1"/>
+          </p:cNvSpPr>
+          <p:nvPr>
+            <p:ph type="sldNum" sz="quarter" idx="10"/>
+          </p:nvPr>
+        </p:nvSpPr>
+        <p:spPr/>
+        <p:txBody>
+          <a:bodyPr/>
+          <a:lstStyle/>
+          <a:p>
+            <a:fld id="{18BDFEC3-8487-43E8-A154-7C12CBC1FFF2}" type="slidenum">
+              <a:rPr lang="en-US"/>
+              <a:t>53</a:t>
             </a:fld>
             <a:endParaRPr lang="en-US"/>
           </a:p>
@@ -23422,12 +24044,12 @@
       </p:grpSpPr>
       <p:sp>
         <p:nvSpPr>
-          <p:cNvPr id="3" name="Content Placeholder 2"/>
+          <p:cNvPr id="2" name="Title 1"/>
           <p:cNvSpPr>
             <a:spLocks noGrp="1"/>
           </p:cNvSpPr>
           <p:nvPr>
-            <p:ph idx="1"/>
+            <p:ph type="title"/>
           </p:nvPr>
         </p:nvSpPr>
         <p:spPr/>
@@ -23436,18 +24058,93 @@
           <a:lstStyle/>
           <a:p>
             <a:pPr lvl="0" marL="0" indent="0">
-              <a:spcBef>
-                <a:spcPts val="3000"/>
-              </a:spcBef>
               <a:buNone/>
             </a:pPr>
             <a:r>
-              <a:rPr b="1"/>
-              <a:t>Barchart fundamentals, Tableau output for dodged bars</a:t>
+              <a:rPr/>
+              <a:t>Barchart</a:t>
+            </a:r>
+            <a:r>
+              <a:rPr/>
+              <a:t> </a:t>
+            </a:r>
+            <a:r>
+              <a:rPr/>
+              <a:t>fundamentals,</a:t>
+            </a:r>
+            <a:r>
+              <a:rPr/>
+              <a:t> </a:t>
+            </a:r>
+            <a:r>
+              <a:rPr/>
+              <a:t>Tableau</a:t>
+            </a:r>
+            <a:r>
+              <a:rPr/>
+              <a:t> </a:t>
+            </a:r>
+            <a:r>
+              <a:rPr/>
+              <a:t>output</a:t>
+            </a:r>
+            <a:r>
+              <a:rPr/>
+              <a:t> </a:t>
+            </a:r>
+            <a:r>
+              <a:rPr/>
+              <a:t>for</a:t>
+            </a:r>
+            <a:r>
+              <a:rPr/>
+              <a:t> </a:t>
+            </a:r>
+            <a:r>
+              <a:rPr/>
+              <a:t>dodged</a:t>
+            </a:r>
+            <a:r>
+              <a:rPr/>
+              <a:t> </a:t>
+            </a:r>
+            <a:r>
+              <a:rPr/>
+              <a:t>bars</a:t>
             </a:r>
           </a:p>
         </p:txBody>
       </p:sp>
+      <p:pic>
+        <p:nvPicPr>
+          <p:cNvPr descr="../images/tableau/dodged-bars.png" id="0" name="Picture 1"/>
+          <p:cNvPicPr>
+            <a:picLocks noGrp="1" noChangeAspect="1"/>
+          </p:cNvPicPr>
+          <p:nvPr/>
+        </p:nvPicPr>
+        <p:blipFill>
+          <a:blip r:embed="rId3"/>
+          <a:stretch>
+            <a:fillRect/>
+          </a:stretch>
+        </p:blipFill>
+        <p:spPr bwMode="auto">
+          <a:xfrm>
+            <a:off x="457200" y="1803400"/>
+            <a:ext cx="8229600" cy="4114800"/>
+          </a:xfrm>
+          <a:prstGeom prst="rect">
+            <a:avLst/>
+          </a:prstGeom>
+          <a:noFill/>
+          <a:ln w="9525">
+            <a:noFill/>
+            <a:headEnd/>
+            <a:tailEnd/>
+          </a:ln>
+        </p:spPr>
+      </p:pic>
     </p:spTree>
   </p:cSld>
 </p:sld>
@@ -23610,36 +24307,134 @@
           <a:chExt cx="0" cy="0"/>
         </a:xfrm>
       </p:grpSpPr>
-      <p:pic>
-        <p:nvPicPr>
-          <p:cNvPr descr="../images/tableau/dodged-bars.png" id="0" name="Picture 1"/>
-          <p:cNvPicPr>
-            <a:picLocks noGrp="1" noChangeAspect="1"/>
-          </p:cNvPicPr>
-          <p:nvPr/>
-        </p:nvPicPr>
-        <p:blipFill>
-          <a:blip r:embed="rId3"/>
-          <a:stretch>
-            <a:fillRect/>
-          </a:stretch>
-        </p:blipFill>
-        <p:spPr bwMode="auto">
-          <a:xfrm>
-            <a:off x="457200" y="1803400"/>
-            <a:ext cx="8229600" cy="4114800"/>
-          </a:xfrm>
-          <a:prstGeom prst="rect">
-            <a:avLst/>
-          </a:prstGeom>
-          <a:noFill/>
-          <a:ln w="9525">
-            <a:noFill/>
-            <a:headEnd/>
-            <a:tailEnd/>
-          </a:ln>
-        </p:spPr>
-      </p:pic>
+      <p:sp>
+        <p:nvSpPr>
+          <p:cNvPr id="2" name="Title 1"/>
+          <p:cNvSpPr>
+            <a:spLocks noGrp="1"/>
+          </p:cNvSpPr>
+          <p:nvPr>
+            <p:ph type="title"/>
+          </p:nvPr>
+        </p:nvSpPr>
+        <p:spPr/>
+        <p:txBody>
+          <a:bodyPr/>
+          <a:lstStyle/>
+          <a:p>
+            <a:pPr lvl="0" marL="0" indent="0">
+              <a:buNone/>
+            </a:pPr>
+            <a:r>
+              <a:rPr/>
+              <a:t>Barchart</a:t>
+            </a:r>
+            <a:r>
+              <a:rPr/>
+              <a:t> </a:t>
+            </a:r>
+            <a:r>
+              <a:rPr/>
+              <a:t>fundamentals,</a:t>
+            </a:r>
+            <a:r>
+              <a:rPr/>
+              <a:t> </a:t>
+            </a:r>
+            <a:r>
+              <a:rPr/>
+              <a:t>Code</a:t>
+            </a:r>
+            <a:r>
+              <a:rPr/>
+              <a:t> </a:t>
+            </a:r>
+            <a:r>
+              <a:rPr/>
+              <a:t>for</a:t>
+            </a:r>
+            <a:r>
+              <a:rPr/>
+              <a:t> </a:t>
+            </a:r>
+            <a:r>
+              <a:rPr/>
+              <a:t>normalize</a:t>
+            </a:r>
+          </a:p>
+        </p:txBody>
+      </p:sp>
+      <p:sp>
+        <p:nvSpPr>
+          <p:cNvPr id="3" name="Content Placeholder 2"/>
+          <p:cNvSpPr>
+            <a:spLocks noGrp="1"/>
+          </p:cNvSpPr>
+          <p:nvPr>
+            <p:ph idx="1"/>
+          </p:nvPr>
+        </p:nvSpPr>
+        <p:spPr/>
+        <p:txBody>
+          <a:bodyPr/>
+          <a:lstStyle/>
+          <a:p>
+            <a:pPr lvl="1"/>
+            <a:r>
+              <a:rPr/>
+              <a:t>Python code</a:t>
+            </a:r>
+          </a:p>
+          <a:p>
+            <a:pPr lvl="0" marL="1270000" indent="0">
+              <a:buNone/>
+            </a:pPr>
+            <a:r>
+              <a:rPr sz="1800">
+                <a:latin typeface="Courier"/>
+              </a:rPr>
+              <a:t>ch = alt.Chart(df).mark_bar().encode(
+    x='sex',
+    y=alt.Y('count()', stack='normalize'),
+    color='pclass:N'
+)</a:t>
+            </a:r>
+          </a:p>
+          <a:p>
+            <a:pPr lvl="1"/>
+            <a:r>
+              <a:rPr/>
+              <a:t>R code</a:t>
+            </a:r>
+          </a:p>
+          <a:p>
+            <a:pPr lvl="0" marL="1270000" indent="0">
+              <a:buNone/>
+            </a:pPr>
+            <a:r>
+              <a:rPr sz="1800">
+                <a:latin typeface="Courier"/>
+              </a:rPr>
+              <a:t>ggplot(titanic, aes(survived)) +
+  geom_bar(aes(fill=sex), position="fill")</a:t>
+            </a:r>
+          </a:p>
+          <a:p>
+            <a:pPr lvl="1"/>
+            <a:r>
+              <a:rPr/>
+              <a:t>Tableau</a:t>
+            </a:r>
+          </a:p>
+          <a:p>
+            <a:pPr lvl="2"/>
+            <a:r>
+              <a:rPr/>
+              <a:t>Drag and drop</a:t>
+            </a:r>
+          </a:p>
+        </p:txBody>
+      </p:sp>
     </p:spTree>
   </p:cSld>
 </p:sld>
@@ -23698,7 +24493,15 @@
             </a:r>
             <a:r>
               <a:rPr/>
-              <a:t>Code</a:t>
+              <a:t>Python</a:t>
+            </a:r>
+            <a:r>
+              <a:rPr/>
+              <a:t> </a:t>
+            </a:r>
+            <a:r>
+              <a:rPr/>
+              <a:t>output</a:t>
             </a:r>
             <a:r>
               <a:rPr/>
@@ -23714,78 +24517,15 @@
             </a:r>
             <a:r>
               <a:rPr/>
-              <a:t>normalize</a:t>
-            </a:r>
-          </a:p>
-        </p:txBody>
-      </p:sp>
-      <p:sp>
-        <p:nvSpPr>
-          <p:cNvPr id="3" name="Content Placeholder 2"/>
-          <p:cNvSpPr>
-            <a:spLocks noGrp="1"/>
-          </p:cNvSpPr>
-          <p:nvPr>
-            <p:ph idx="1"/>
-          </p:nvPr>
-        </p:nvSpPr>
-        <p:spPr/>
-        <p:txBody>
-          <a:bodyPr/>
-          <a:lstStyle/>
-          <a:p>
-            <a:pPr lvl="1"/>
-            <a:r>
-              <a:rPr/>
-              <a:t>Python code</a:t>
-            </a:r>
-          </a:p>
-          <a:p>
-            <a:pPr lvl="0" marL="1270000" indent="0">
-              <a:buNone/>
-            </a:pPr>
-            <a:r>
-              <a:rPr sz="1800">
-                <a:latin typeface="Courier"/>
-              </a:rPr>
-              <a:t>ch = alt.Chart(df).mark_bar().encode(
-    x='sex',
-    y=alt.Y('count()', stack='normalize'),
-    color='pclass:N'
-)</a:t>
-            </a:r>
-          </a:p>
-          <a:p>
-            <a:pPr lvl="1"/>
-            <a:r>
-              <a:rPr/>
-              <a:t>R code</a:t>
-            </a:r>
-          </a:p>
-          <a:p>
-            <a:pPr lvl="0" marL="1270000" indent="0">
-              <a:buNone/>
-            </a:pPr>
-            <a:r>
-              <a:rPr sz="1800">
-                <a:latin typeface="Courier"/>
-              </a:rPr>
-              <a:t>ggplot(titanic, aes(survived)) +
-  geom_bar(aes(fill=sex), position="fill")</a:t>
-            </a:r>
-          </a:p>
-          <a:p>
-            <a:pPr lvl="1"/>
-            <a:r>
-              <a:rPr/>
-              <a:t>Tableau</a:t>
-            </a:r>
-          </a:p>
-          <a:p>
-            <a:pPr lvl="2"/>
-            <a:r>
-              <a:rPr/>
-              <a:t>Drag and drop</a:t>
+              <a:t>normalized</a:t>
+            </a:r>
+            <a:r>
+              <a:rPr/>
+              <a:t> </a:t>
+            </a:r>
+            <a:r>
+              <a:rPr/>
+              <a:t>bars</a:t>
             </a:r>
           </a:p>
         </p:txBody>
@@ -23848,7 +24588,7 @@
             </a:r>
             <a:r>
               <a:rPr/>
-              <a:t>Python</a:t>
+              <a:t>R</a:t>
             </a:r>
             <a:r>
               <a:rPr/>
@@ -23885,6 +24625,36 @@
           </a:p>
         </p:txBody>
       </p:sp>
+      <p:pic>
+        <p:nvPicPr>
+          <p:cNvPr descr="../images/r/count-by-normalize.png" id="0" name="Picture 1"/>
+          <p:cNvPicPr>
+            <a:picLocks noGrp="1" noChangeAspect="1"/>
+          </p:cNvPicPr>
+          <p:nvPr/>
+        </p:nvPicPr>
+        <p:blipFill>
+          <a:blip r:embed="rId3"/>
+          <a:stretch>
+            <a:fillRect/>
+          </a:stretch>
+        </p:blipFill>
+        <p:spPr bwMode="auto">
+          <a:xfrm>
+            <a:off x="2311400" y="1600200"/>
+            <a:ext cx="4521200" cy="4521200"/>
+          </a:xfrm>
+          <a:prstGeom prst="rect">
+            <a:avLst/>
+          </a:prstGeom>
+          <a:noFill/>
+          <a:ln w="9525">
+            <a:noFill/>
+            <a:headEnd/>
+            <a:tailEnd/>
+          </a:ln>
+        </p:spPr>
+      </p:pic>
     </p:spTree>
   </p:cSld>
 </p:sld>
@@ -23943,7 +24713,7 @@
             </a:r>
             <a:r>
               <a:rPr/>
-              <a:t>R</a:t>
+              <a:t>Tableau</a:t>
             </a:r>
             <a:r>
               <a:rPr/>
@@ -23982,7 +24752,7 @@
       </p:sp>
       <p:pic>
         <p:nvPicPr>
-          <p:cNvPr descr="../images/r/count-by-normalize.png" id="0" name="Picture 1"/>
+          <p:cNvPr descr="../images/tableau/table-calculation.png" id="0" name="Picture 1"/>
           <p:cNvPicPr>
             <a:picLocks noGrp="1" noChangeAspect="1"/>
           </p:cNvPicPr>
@@ -23996,8 +24766,8 @@
         </p:blipFill>
         <p:spPr bwMode="auto">
           <a:xfrm>
-            <a:off x="2311400" y="1600200"/>
-            <a:ext cx="4521200" cy="4521200"/>
+            <a:off x="3162300" y="1600200"/>
+            <a:ext cx="2832100" cy="4521200"/>
           </a:xfrm>
           <a:prstGeom prst="rect">
             <a:avLst/>
@@ -24107,7 +24877,7 @@
       </p:sp>
       <p:pic>
         <p:nvPicPr>
-          <p:cNvPr descr="../images/tableau/table-calculation.png" id="0" name="Picture 1"/>
+          <p:cNvPr descr="../images/tableau/normalized-bars.png" id="0" name="Picture 1"/>
           <p:cNvPicPr>
             <a:picLocks noGrp="1" noChangeAspect="1"/>
           </p:cNvPicPr>
@@ -24121,8 +24891,8 @@
         </p:blipFill>
         <p:spPr bwMode="auto">
           <a:xfrm>
-            <a:off x="3162300" y="1600200"/>
-            <a:ext cx="2832100" cy="4521200"/>
+            <a:off x="457200" y="1803400"/>
+            <a:ext cx="8229600" cy="4114800"/>
           </a:xfrm>
           <a:prstGeom prst="rect">
             <a:avLst/>
@@ -24177,89 +24947,58 @@
             </a:pPr>
             <a:r>
               <a:rPr/>
-              <a:t>Barchart</a:t>
-            </a:r>
-            <a:r>
-              <a:rPr/>
-              <a:t> </a:t>
-            </a:r>
-            <a:r>
-              <a:rPr/>
-              <a:t>fundamentals,</a:t>
-            </a:r>
-            <a:r>
-              <a:rPr/>
-              <a:t> </a:t>
-            </a:r>
-            <a:r>
-              <a:rPr/>
-              <a:t>Tableau</a:t>
-            </a:r>
-            <a:r>
-              <a:rPr/>
-              <a:t> </a:t>
-            </a:r>
-            <a:r>
-              <a:rPr/>
-              <a:t>output</a:t>
-            </a:r>
-            <a:r>
-              <a:rPr/>
-              <a:t> </a:t>
-            </a:r>
-            <a:r>
-              <a:rPr/>
-              <a:t>for</a:t>
-            </a:r>
-            <a:r>
-              <a:rPr/>
-              <a:t> </a:t>
-            </a:r>
-            <a:r>
-              <a:rPr/>
-              <a:t>normalized</a:t>
-            </a:r>
-            <a:r>
-              <a:rPr/>
-              <a:t> </a:t>
-            </a:r>
-            <a:r>
-              <a:rPr/>
-              <a:t>bars</a:t>
+              <a:t>Exercise,</a:t>
+            </a:r>
+            <a:r>
+              <a:rPr/>
+              <a:t> </a:t>
+            </a:r>
+            <a:r>
+              <a:rPr/>
+              <a:t>Mortality</a:t>
+            </a:r>
+            <a:r>
+              <a:rPr/>
+              <a:t> </a:t>
+            </a:r>
+            <a:r>
+              <a:rPr/>
+              <a:t>by</a:t>
+            </a:r>
+            <a:r>
+              <a:rPr/>
+              <a:t> </a:t>
+            </a:r>
+            <a:r>
+              <a:rPr/>
+              <a:t>gender</a:t>
             </a:r>
           </a:p>
         </p:txBody>
       </p:sp>
-      <p:pic>
-        <p:nvPicPr>
-          <p:cNvPr descr="../images/tableau/normalized-bars.png" id="0" name="Picture 1"/>
-          <p:cNvPicPr>
-            <a:picLocks noGrp="1" noChangeAspect="1"/>
-          </p:cNvPicPr>
-          <p:nvPr/>
-        </p:nvPicPr>
-        <p:blipFill>
-          <a:blip r:embed="rId3"/>
-          <a:stretch>
-            <a:fillRect/>
-          </a:stretch>
-        </p:blipFill>
-        <p:spPr bwMode="auto">
-          <a:xfrm>
-            <a:off x="457200" y="1803400"/>
-            <a:ext cx="8229600" cy="4114800"/>
-          </a:xfrm>
-          <a:prstGeom prst="rect">
-            <a:avLst/>
-          </a:prstGeom>
-          <a:noFill/>
-          <a:ln w="9525">
-            <a:noFill/>
-            <a:headEnd/>
-            <a:tailEnd/>
-          </a:ln>
-        </p:spPr>
-      </p:pic>
+      <p:sp>
+        <p:nvSpPr>
+          <p:cNvPr id="3" name="Content Placeholder 2"/>
+          <p:cNvSpPr>
+            <a:spLocks noGrp="1"/>
+          </p:cNvSpPr>
+          <p:nvPr>
+            <p:ph idx="1"/>
+          </p:nvPr>
+        </p:nvSpPr>
+        <p:spPr/>
+        <p:txBody>
+          <a:bodyPr/>
+          <a:lstStyle/>
+          <a:p>
+            <a:pPr lvl="1"/>
+            <a:r>
+              <a:rPr/>
+              <a:t>Draw a bar chart showing counts involving both mortality and gender. Use normalized bars.</a:t>
+            </a:r>
+          </a:p>
+        </p:txBody>
+      </p:sp>
     </p:spTree>
   </p:cSld>
 </p:sld>
@@ -24302,31 +25041,15 @@
             </a:pPr>
             <a:r>
               <a:rPr/>
-              <a:t>Exercise,</a:t>
-            </a:r>
-            <a:r>
-              <a:rPr/>
-              <a:t> </a:t>
-            </a:r>
-            <a:r>
-              <a:rPr/>
-              <a:t>Mortality</a:t>
-            </a:r>
-            <a:r>
-              <a:rPr/>
-              <a:t> </a:t>
-            </a:r>
-            <a:r>
-              <a:rPr/>
-              <a:t>by</a:t>
-            </a:r>
-            <a:r>
-              <a:rPr/>
-              <a:t> </a:t>
-            </a:r>
-            <a:r>
-              <a:rPr/>
-              <a:t>gender</a:t>
+              <a:t>Exercise,Python</a:t>
+            </a:r>
+            <a:r>
+              <a:rPr/>
+              <a:t> </a:t>
+            </a:r>
+            <a:r>
+              <a:rPr/>
+              <a:t>code</a:t>
             </a:r>
           </a:p>
         </p:txBody>
@@ -24349,7 +25072,44 @@
             <a:pPr lvl="1"/>
             <a:r>
               <a:rPr/>
-              <a:t>Draw a bar chart showing counts involving both mortality and gender. Use stacked bars, then dodged bars. Which do you like best?</a:t>
+              <a:t>Python code</a:t>
+            </a:r>
+          </a:p>
+          <a:p>
+            <a:pPr lvl="0" marL="1270000" indent="0">
+              <a:buNone/>
+            </a:pPr>
+            <a:r>
+              <a:rPr sz="1800">
+                <a:latin typeface="Courier"/>
+              </a:rPr>
+              <a:t>ch = alt.Chart(df).mark_bar().encode(
+    x='sex',
+    y=alt.Y('count()', stack='normalize'),
+    color='survived'
+)</a:t>
+            </a:r>
+          </a:p>
+          <a:p>
+            <a:pPr lvl="1"/>
+            <a:r>
+              <a:rPr/>
+              <a:t>Alternative</a:t>
+            </a:r>
+          </a:p>
+          <a:p>
+            <a:pPr lvl="0" marL="1270000" indent="0">
+              <a:buNone/>
+            </a:pPr>
+            <a:r>
+              <a:rPr sz="1800">
+                <a:latin typeface="Courier"/>
+              </a:rPr>
+              <a:t>ch = alt.Chart(df).mark_bar().encode(
+    x='survived',
+    y=alt.Y('count()', stack='normalize'),
+    color='sex'
+)</a:t>
             </a:r>
           </a:p>
         </p:txBody>
@@ -24396,49 +25156,131 @@
             </a:pPr>
             <a:r>
               <a:rPr/>
-              <a:t>Exercise,Python</a:t>
-            </a:r>
-            <a:r>
-              <a:rPr/>
-              <a:t> </a:t>
-            </a:r>
-            <a:r>
-              <a:rPr/>
-              <a:t>code</a:t>
+              <a:t>Exercise,</a:t>
+            </a:r>
+            <a:r>
+              <a:rPr/>
+              <a:t> </a:t>
+            </a:r>
+            <a:r>
+              <a:rPr/>
+              <a:t>Python</a:t>
+            </a:r>
+            <a:r>
+              <a:rPr/>
+              <a:t> </a:t>
+            </a:r>
+            <a:r>
+              <a:rPr/>
+              <a:t>output,</a:t>
+            </a:r>
+            <a:r>
+              <a:rPr/>
+              <a:t> </a:t>
+            </a:r>
+            <a:r>
+              <a:rPr/>
+              <a:t>Mortality</a:t>
+            </a:r>
+            <a:r>
+              <a:rPr/>
+              <a:t> </a:t>
+            </a:r>
+            <a:r>
+              <a:rPr/>
+              <a:t>by</a:t>
+            </a:r>
+            <a:r>
+              <a:rPr/>
+              <a:t> </a:t>
+            </a:r>
+            <a:r>
+              <a:rPr/>
+              <a:t>sex</a:t>
             </a:r>
           </a:p>
         </p:txBody>
       </p:sp>
+      <p:pic>
+        <p:nvPicPr>
+          <p:cNvPr descr="../images/python/mortality-by-sex.png" id="0" name="Picture 1"/>
+          <p:cNvPicPr>
+            <a:picLocks noGrp="1" noChangeAspect="1"/>
+          </p:cNvPicPr>
+          <p:nvPr/>
+        </p:nvPicPr>
+        <p:blipFill>
+          <a:blip r:embed="rId3"/>
+          <a:stretch>
+            <a:fillRect/>
+          </a:stretch>
+        </p:blipFill>
+        <p:spPr bwMode="auto">
+          <a:xfrm>
+            <a:off x="3759200" y="1600200"/>
+            <a:ext cx="1612900" cy="4013200"/>
+          </a:xfrm>
+          <a:prstGeom prst="rect">
+            <a:avLst/>
+          </a:prstGeom>
+          <a:noFill/>
+          <a:ln w="9525">
+            <a:noFill/>
+            <a:headEnd/>
+            <a:tailEnd/>
+          </a:ln>
+        </p:spPr>
+      </p:pic>
       <p:sp>
         <p:nvSpPr>
-          <p:cNvPr id="3" name="Content Placeholder 2"/>
-          <p:cNvSpPr>
-            <a:spLocks noGrp="1"/>
-          </p:cNvSpPr>
-          <p:nvPr>
-            <p:ph idx="1"/>
-          </p:nvPr>
+          <p:cNvPr id="1" name="TextBox 3"/>
+          <p:cNvSpPr txBox="1"/>
+          <p:nvPr/>
         </p:nvSpPr>
-        <p:spPr/>
+        <p:spPr>
+          <a:xfrm>
+            <a:off x="457200" y="5613400"/>
+            <a:ext cx="8229600" cy="508000"/>
+          </a:xfrm>
+          <a:prstGeom prst="rect">
+            <a:avLst/>
+          </a:prstGeom>
+          <a:noFill/>
+        </p:spPr>
         <p:txBody>
           <a:bodyPr/>
           <a:lstStyle/>
           <a:p>
-            <a:pPr lvl="1"/>
-            <a:r>
-              <a:rPr/>
-              <a:t>Python code</a:t>
-            </a:r>
-          </a:p>
-          <a:p>
-            <a:pPr lvl="0" marL="1270000" indent="0">
+            <a:pPr lvl="0" marL="0" indent="0" algn="ctr">
               <a:buNone/>
             </a:pPr>
             <a:r>
-              <a:rPr sz="1800">
-                <a:latin typeface="Courier"/>
-              </a:rPr>
-              <a:t>((Python code))</a:t>
+              <a:rPr/>
+              <a:t>Mortality</a:t>
+            </a:r>
+            <a:r>
+              <a:rPr/>
+              <a:t> </a:t>
+            </a:r>
+            <a:r>
+              <a:rPr/>
+              <a:t>by</a:t>
+            </a:r>
+            <a:r>
+              <a:rPr/>
+              <a:t> </a:t>
+            </a:r>
+            <a:r>
+              <a:rPr/>
+              <a:t>sex</a:t>
+            </a:r>
+            <a:r>
+              <a:rPr/>
+              <a:t> </a:t>
+            </a:r>
+            <a:r>
+              <a:rPr/>
+              <a:t>barchart</a:t>
             </a:r>
           </a:p>
         </p:txBody>
@@ -24501,32 +25343,115 @@
             </a:r>
             <a:r>
               <a:rPr/>
-              <a:t>output</a:t>
+              <a:t>output,</a:t>
+            </a:r>
+            <a:r>
+              <a:rPr/>
+              <a:t> </a:t>
+            </a:r>
+            <a:r>
+              <a:rPr/>
+              <a:t>Sex</a:t>
+            </a:r>
+            <a:r>
+              <a:rPr/>
+              <a:t> </a:t>
+            </a:r>
+            <a:r>
+              <a:rPr/>
+              <a:t>by</a:t>
+            </a:r>
+            <a:r>
+              <a:rPr/>
+              <a:t> </a:t>
+            </a:r>
+            <a:r>
+              <a:rPr/>
+              <a:t>mortality</a:t>
             </a:r>
           </a:p>
         </p:txBody>
       </p:sp>
+      <p:pic>
+        <p:nvPicPr>
+          <p:cNvPr descr="../images/python/sex-by-mortality.png" id="0" name="Picture 1"/>
+          <p:cNvPicPr>
+            <a:picLocks noGrp="1" noChangeAspect="1"/>
+          </p:cNvPicPr>
+          <p:nvPr/>
+        </p:nvPicPr>
+        <p:blipFill>
+          <a:blip r:embed="rId3"/>
+          <a:stretch>
+            <a:fillRect/>
+          </a:stretch>
+        </p:blipFill>
+        <p:spPr bwMode="auto">
+          <a:xfrm>
+            <a:off x="3708400" y="1600200"/>
+            <a:ext cx="1727200" cy="4013200"/>
+          </a:xfrm>
+          <a:prstGeom prst="rect">
+            <a:avLst/>
+          </a:prstGeom>
+          <a:noFill/>
+          <a:ln w="9525">
+            <a:noFill/>
+            <a:headEnd/>
+            <a:tailEnd/>
+          </a:ln>
+        </p:spPr>
+      </p:pic>
       <p:sp>
         <p:nvSpPr>
-          <p:cNvPr id="3" name="Content Placeholder 2"/>
-          <p:cNvSpPr>
-            <a:spLocks noGrp="1"/>
-          </p:cNvSpPr>
-          <p:nvPr>
-            <p:ph idx="1"/>
-          </p:nvPr>
+          <p:cNvPr id="1" name="TextBox 3"/>
+          <p:cNvSpPr txBox="1"/>
+          <p:nvPr/>
         </p:nvSpPr>
-        <p:spPr/>
+        <p:spPr>
+          <a:xfrm>
+            <a:off x="457200" y="5613400"/>
+            <a:ext cx="8229600" cy="508000"/>
+          </a:xfrm>
+          <a:prstGeom prst="rect">
+            <a:avLst/>
+          </a:prstGeom>
+          <a:noFill/>
+        </p:spPr>
         <p:txBody>
           <a:bodyPr/>
           <a:lstStyle/>
           <a:p>
-            <a:pPr lvl="0" marL="0" indent="0">
+            <a:pPr lvl="0" marL="0" indent="0" algn="ctr">
               <a:buNone/>
             </a:pPr>
             <a:r>
               <a:rPr/>
-              <a:t>((Python results))</a:t>
+              <a:t>Sex</a:t>
+            </a:r>
+            <a:r>
+              <a:rPr/>
+              <a:t> </a:t>
+            </a:r>
+            <a:r>
+              <a:rPr/>
+              <a:t>by</a:t>
+            </a:r>
+            <a:r>
+              <a:rPr/>
+              <a:t> </a:t>
+            </a:r>
+            <a:r>
+              <a:rPr/>
+              <a:t>mortality</a:t>
+            </a:r>
+            <a:r>
+              <a:rPr/>
+              <a:t> </a:t>
+            </a:r>
+            <a:r>
+              <a:rPr/>
+              <a:t>barchart</a:t>
             </a:r>
           </a:p>
         </p:txBody>
@@ -24623,7 +25548,27 @@
               <a:rPr sz="1800">
                 <a:latin typeface="Courier"/>
               </a:rPr>
-              <a:t/>
+              <a:t>ggplot(titanic, aes(x=survived, fill=sex)) +
+  geom_bar(position="normalize")</a:t>
+            </a:r>
+          </a:p>
+          <a:p>
+            <a:pPr lvl="1"/>
+            <a:r>
+              <a:rPr/>
+              <a:t>Alternate version</a:t>
+            </a:r>
+          </a:p>
+          <a:p>
+            <a:pPr lvl="0" marL="1270000" indent="0">
+              <a:buNone/>
+            </a:pPr>
+            <a:r>
+              <a:rPr sz="1800">
+                <a:latin typeface="Courier"/>
+              </a:rPr>
+              <a:t>ggplot(titanic, aes(x=sex, fill=survived)) +
+  geom_bar(position="normalize")</a:t>
             </a:r>
           </a:p>
         </p:txBody>
@@ -24857,21 +25802,45 @@
             </a:r>
             <a:r>
               <a:rPr/>
-              <a:t>output</a:t>
+              <a:t>output,</a:t>
+            </a:r>
+            <a:r>
+              <a:rPr/>
+              <a:t> </a:t>
+            </a:r>
+            <a:r>
+              <a:rPr/>
+              <a:t>Mortality</a:t>
+            </a:r>
+            <a:r>
+              <a:rPr/>
+              <a:t> </a:t>
+            </a:r>
+            <a:r>
+              <a:rPr/>
+              <a:t>by</a:t>
+            </a:r>
+            <a:r>
+              <a:rPr/>
+              <a:t> </a:t>
+            </a:r>
+            <a:r>
+              <a:rPr/>
+              <a:t>sex</a:t>
             </a:r>
           </a:p>
         </p:txBody>
       </p:sp>
       <p:pic>
         <p:nvPicPr>
-          <p:cNvPr descr="../images/r/stack-1.png" id="0" name="Picture 1"/>
+          <p:cNvPr descr="../images/r/mortality-by-sex.png" id="0" name="Picture 1"/>
           <p:cNvPicPr>
             <a:picLocks noGrp="1" noChangeAspect="1"/>
           </p:cNvPicPr>
           <p:nvPr/>
         </p:nvPicPr>
         <p:blipFill>
-          <a:blip r:embed="rId2"/>
+          <a:blip r:embed="rId3"/>
           <a:stretch>
             <a:fillRect/>
           </a:stretch>
@@ -24950,21 +25919,45 @@
             </a:r>
             <a:r>
               <a:rPr/>
-              <a:t>output</a:t>
+              <a:t>output,</a:t>
+            </a:r>
+            <a:r>
+              <a:rPr/>
+              <a:t> </a:t>
+            </a:r>
+            <a:r>
+              <a:rPr/>
+              <a:t>Sex</a:t>
+            </a:r>
+            <a:r>
+              <a:rPr/>
+              <a:t> </a:t>
+            </a:r>
+            <a:r>
+              <a:rPr/>
+              <a:t>by</a:t>
+            </a:r>
+            <a:r>
+              <a:rPr/>
+              <a:t> </a:t>
+            </a:r>
+            <a:r>
+              <a:rPr/>
+              <a:t>mortality</a:t>
             </a:r>
           </a:p>
         </p:txBody>
       </p:sp>
       <p:pic>
         <p:nvPicPr>
-          <p:cNvPr descr="../images/r/stack-2.png" id="0" name="Picture 1"/>
+          <p:cNvPr descr="../images/r/sex-by-mortality.png" id="0" name="Picture 1"/>
           <p:cNvPicPr>
             <a:picLocks noGrp="1" noChangeAspect="1"/>
           </p:cNvPicPr>
           <p:nvPr/>
         </p:nvPicPr>
         <p:blipFill>
-          <a:blip r:embed="rId2"/>
+          <a:blip r:embed="rId3"/>
           <a:stretch>
             <a:fillRect/>
           </a:stretch>
@@ -25035,37 +26028,61 @@
             </a:r>
             <a:r>
               <a:rPr/>
-              <a:t>R</a:t>
-            </a:r>
-            <a:r>
-              <a:rPr/>
-              <a:t> </a:t>
-            </a:r>
-            <a:r>
-              <a:rPr/>
-              <a:t>output</a:t>
+              <a:t>Tableau</a:t>
+            </a:r>
+            <a:r>
+              <a:rPr/>
+              <a:t> </a:t>
+            </a:r>
+            <a:r>
+              <a:rPr/>
+              <a:t>output,</a:t>
+            </a:r>
+            <a:r>
+              <a:rPr/>
+              <a:t> </a:t>
+            </a:r>
+            <a:r>
+              <a:rPr/>
+              <a:t>mortality</a:t>
+            </a:r>
+            <a:r>
+              <a:rPr/>
+              <a:t> </a:t>
+            </a:r>
+            <a:r>
+              <a:rPr/>
+              <a:t>by</a:t>
+            </a:r>
+            <a:r>
+              <a:rPr/>
+              <a:t> </a:t>
+            </a:r>
+            <a:r>
+              <a:rPr/>
+              <a:t>sex</a:t>
             </a:r>
           </a:p>
         </p:txBody>
       </p:sp>
       <p:pic>
         <p:nvPicPr>
-          <p:cNvPr descr="../images/r/dodge-1.png" id="0" name="Picture 1"/>
+          <p:cNvPr descr="../images/tableau/mortality-by-sex.png" id="0" name="Picture 1"/>
           <p:cNvPicPr>
             <a:picLocks noGrp="1" noChangeAspect="1"/>
           </p:cNvPicPr>
           <p:nvPr/>
         </p:nvPicPr>
         <p:blipFill>
-          <a:blip r:embed="rId2"/>
+          <a:blip r:embed="rId3"/>
           <a:stretch>
             <a:fillRect/>
           </a:stretch>
         </p:blipFill>
         <p:spPr bwMode="auto">
           <a:xfrm>
-            <a:off x="2311400" y="1600200"/>
-            <a:ext cx="4521200" cy="4521200"/>
+            <a:off x="558800" y="1600200"/>
+            <a:ext cx="8026400" cy="4013200"/>
           </a:xfrm>
           <a:prstGeom prst="rect">
             <a:avLst/>
@@ -25078,6 +26095,60 @@
           </a:ln>
         </p:spPr>
       </p:pic>
+      <p:sp>
+        <p:nvSpPr>
+          <p:cNvPr id="1" name="TextBox 3"/>
+          <p:cNvSpPr txBox="1"/>
+          <p:nvPr/>
+        </p:nvSpPr>
+        <p:spPr>
+          <a:xfrm>
+            <a:off x="457200" y="5613400"/>
+            <a:ext cx="8229600" cy="508000"/>
+          </a:xfrm>
+          <a:prstGeom prst="rect">
+            <a:avLst/>
+          </a:prstGeom>
+          <a:noFill/>
+        </p:spPr>
+        <p:txBody>
+          <a:bodyPr/>
+          <a:lstStyle/>
+          <a:p>
+            <a:pPr lvl="0" marL="0" indent="0" algn="ctr">
+              <a:buNone/>
+            </a:pPr>
+            <a:r>
+              <a:rPr/>
+              <a:t>Mortality</a:t>
+            </a:r>
+            <a:r>
+              <a:rPr/>
+              <a:t> </a:t>
+            </a:r>
+            <a:r>
+              <a:rPr/>
+              <a:t>by</a:t>
+            </a:r>
+            <a:r>
+              <a:rPr/>
+              <a:t> </a:t>
+            </a:r>
+            <a:r>
+              <a:rPr/>
+              <a:t>sex</a:t>
+            </a:r>
+            <a:r>
+              <a:rPr/>
+              <a:t> </a:t>
+            </a:r>
+            <a:r>
+              <a:rPr/>
+              <a:t>barchart</a:t>
+            </a:r>
+          </a:p>
+        </p:txBody>
+      </p:sp>
     </p:spTree>
   </p:cSld>
 </p:sld>
@@ -25128,37 +26199,61 @@
             </a:r>
             <a:r>
               <a:rPr/>
-              <a:t>R</a:t>
-            </a:r>
-            <a:r>
-              <a:rPr/>
-              <a:t> </a:t>
-            </a:r>
-            <a:r>
-              <a:rPr/>
-              <a:t>output</a:t>
+              <a:t>Tableau</a:t>
+            </a:r>
+            <a:r>
+              <a:rPr/>
+              <a:t> </a:t>
+            </a:r>
+            <a:r>
+              <a:rPr/>
+              <a:t>output,</a:t>
+            </a:r>
+            <a:r>
+              <a:rPr/>
+              <a:t> </a:t>
+            </a:r>
+            <a:r>
+              <a:rPr/>
+              <a:t>sex</a:t>
+            </a:r>
+            <a:r>
+              <a:rPr/>
+              <a:t> </a:t>
+            </a:r>
+            <a:r>
+              <a:rPr/>
+              <a:t>by</a:t>
+            </a:r>
+            <a:r>
+              <a:rPr/>
+              <a:t> </a:t>
+            </a:r>
+            <a:r>
+              <a:rPr/>
+              <a:t>mortality</a:t>
             </a:r>
           </a:p>
         </p:txBody>
       </p:sp>
       <p:pic>
         <p:nvPicPr>
-          <p:cNvPr descr="../images/r/dodge-2.png" id="0" name="Picture 1"/>
+          <p:cNvPr descr="../images/tableau/sex-by-mortality.png" id="0" name="Picture 1"/>
           <p:cNvPicPr>
             <a:picLocks noGrp="1" noChangeAspect="1"/>
           </p:cNvPicPr>
           <p:nvPr/>
         </p:nvPicPr>
         <p:blipFill>
-          <a:blip r:embed="rId2"/>
+          <a:blip r:embed="rId3"/>
           <a:stretch>
             <a:fillRect/>
           </a:stretch>
         </p:blipFill>
         <p:spPr bwMode="auto">
           <a:xfrm>
-            <a:off x="2311400" y="1600200"/>
-            <a:ext cx="4521200" cy="4521200"/>
+            <a:off x="558800" y="1600200"/>
+            <a:ext cx="8026400" cy="4013200"/>
           </a:xfrm>
           <a:prstGeom prst="rect">
             <a:avLst/>
@@ -25171,6 +26266,60 @@
           </a:ln>
         </p:spPr>
       </p:pic>
+      <p:sp>
+        <p:nvSpPr>
+          <p:cNvPr id="1" name="TextBox 3"/>
+          <p:cNvSpPr txBox="1"/>
+          <p:nvPr/>
+        </p:nvSpPr>
+        <p:spPr>
+          <a:xfrm>
+            <a:off x="457200" y="5613400"/>
+            <a:ext cx="8229600" cy="508000"/>
+          </a:xfrm>
+          <a:prstGeom prst="rect">
+            <a:avLst/>
+          </a:prstGeom>
+          <a:noFill/>
+        </p:spPr>
+        <p:txBody>
+          <a:bodyPr/>
+          <a:lstStyle/>
+          <a:p>
+            <a:pPr lvl="0" marL="0" indent="0" algn="ctr">
+              <a:buNone/>
+            </a:pPr>
+            <a:r>
+              <a:rPr/>
+              <a:t>Sex</a:t>
+            </a:r>
+            <a:r>
+              <a:rPr/>
+              <a:t> </a:t>
+            </a:r>
+            <a:r>
+              <a:rPr/>
+              <a:t>by</a:t>
+            </a:r>
+            <a:r>
+              <a:rPr/>
+              <a:t> </a:t>
+            </a:r>
+            <a:r>
+              <a:rPr/>
+              <a:t>mortality</a:t>
+            </a:r>
+            <a:r>
+              <a:rPr/>
+              <a:t> </a:t>
+            </a:r>
+            <a:r>
+              <a:rPr/>
+              <a:t>barchart</a:t>
+            </a:r>
+          </a:p>
+        </p:txBody>
+      </p:sp>
     </p:spTree>
   </p:cSld>
 </p:sld>
@@ -25213,15 +26362,23 @@
             </a:pPr>
             <a:r>
               <a:rPr/>
-              <a:t>Exercise,</a:t>
-            </a:r>
-            <a:r>
-              <a:rPr/>
-              <a:t> </a:t>
-            </a:r>
-            <a:r>
-              <a:rPr/>
-              <a:t>Tableau</a:t>
+              <a:t>Barchart</a:t>
+            </a:r>
+            <a:r>
+              <a:rPr/>
+              <a:t> </a:t>
+            </a:r>
+            <a:r>
+              <a:rPr/>
+              <a:t>fundamentals,</a:t>
+            </a:r>
+            <a:r>
+              <a:rPr/>
+              <a:t> </a:t>
+            </a:r>
+            <a:r>
+              <a:rPr/>
+              <a:t>Python</a:t>
             </a:r>
             <a:r>
               <a:rPr/>
@@ -25230,31 +26387,130 @@
             <a:r>
               <a:rPr/>
               <a:t>output</a:t>
+            </a:r>
+            <a:r>
+              <a:rPr/>
+              <a:t> </a:t>
+            </a:r>
+            <a:r>
+              <a:rPr/>
+              <a:t>for</a:t>
+            </a:r>
+            <a:r>
+              <a:rPr/>
+              <a:t> </a:t>
+            </a:r>
+            <a:r>
+              <a:rPr/>
+              <a:t>mean</a:t>
+            </a:r>
+            <a:r>
+              <a:rPr/>
+              <a:t> </a:t>
+            </a:r>
+            <a:r>
+              <a:rPr/>
+              <a:t>bars</a:t>
             </a:r>
           </a:p>
         </p:txBody>
       </p:sp>
+      <p:pic>
+        <p:nvPicPr>
+          <p:cNvPr descr="../images/python/mean-barchart.png" id="0" name="Picture 1"/>
+          <p:cNvPicPr>
+            <a:picLocks noGrp="1" noChangeAspect="1"/>
+          </p:cNvPicPr>
+          <p:nvPr/>
+        </p:nvPicPr>
+        <p:blipFill>
+          <a:blip r:embed="rId2"/>
+          <a:stretch>
+            <a:fillRect/>
+          </a:stretch>
+        </p:blipFill>
+        <p:spPr bwMode="auto">
+          <a:xfrm>
+            <a:off x="4076700" y="1600200"/>
+            <a:ext cx="990600" cy="4013200"/>
+          </a:xfrm>
+          <a:prstGeom prst="rect">
+            <a:avLst/>
+          </a:prstGeom>
+          <a:noFill/>
+          <a:ln w="9525">
+            <a:noFill/>
+            <a:headEnd/>
+            <a:tailEnd/>
+          </a:ln>
+        </p:spPr>
+      </p:pic>
       <p:sp>
         <p:nvSpPr>
-          <p:cNvPr id="3" name="Content Placeholder 2"/>
-          <p:cNvSpPr>
-            <a:spLocks noGrp="1"/>
-          </p:cNvSpPr>
-          <p:nvPr>
-            <p:ph idx="1"/>
-          </p:nvPr>
+          <p:cNvPr id="1" name="TextBox 3"/>
+          <p:cNvSpPr txBox="1"/>
+          <p:nvPr/>
         </p:nvSpPr>
-        <p:spPr/>
+        <p:spPr>
+          <a:xfrm>
+            <a:off x="457200" y="5613400"/>
+            <a:ext cx="8229600" cy="508000"/>
+          </a:xfrm>
+          <a:prstGeom prst="rect">
+            <a:avLst/>
+          </a:prstGeom>
+          <a:noFill/>
+        </p:spPr>
         <p:txBody>
           <a:bodyPr/>
           <a:lstStyle/>
           <a:p>
-            <a:pPr lvl="0" marL="0" indent="0">
+            <a:pPr lvl="0" marL="0" indent="0" algn="ctr">
               <a:buNone/>
             </a:pPr>
             <a:r>
               <a:rPr/>
-              <a:t>((Tableau results))</a:t>
+              <a:t>Barchart</a:t>
+            </a:r>
+            <a:r>
+              <a:rPr/>
+              <a:t> </a:t>
+            </a:r>
+            <a:r>
+              <a:rPr/>
+              <a:t>of</a:t>
+            </a:r>
+            <a:r>
+              <a:rPr/>
+              <a:t> </a:t>
+            </a:r>
+            <a:r>
+              <a:rPr/>
+              <a:t>mean</a:t>
+            </a:r>
+            <a:r>
+              <a:rPr/>
+              <a:t> </a:t>
+            </a:r>
+            <a:r>
+              <a:rPr/>
+              <a:t>ages</a:t>
+            </a:r>
+            <a:r>
+              <a:rPr/>
+              <a:t> </a:t>
+            </a:r>
+            <a:r>
+              <a:rPr/>
+              <a:t>by</a:t>
+            </a:r>
+            <a:r>
+              <a:rPr/>
+              <a:t> </a:t>
+            </a:r>
+            <a:r>
+              <a:rPr/>
+              <a:t>sex</a:t>
             </a:r>
           </a:p>
         </p:txBody>
@@ -25317,226 +26573,30 @@
             </a:r>
             <a:r>
               <a:rPr/>
-              <a:t>Switching</a:t>
-            </a:r>
-            <a:r>
-              <a:rPr/>
-              <a:t> </a:t>
-            </a:r>
-            <a:r>
-              <a:rPr/>
-              <a:t>from</a:t>
-            </a:r>
-            <a:r>
-              <a:rPr/>
-              <a:t> </a:t>
-            </a:r>
-            <a:r>
-              <a:rPr/>
-              <a:t>count</a:t>
-            </a:r>
-            <a:r>
-              <a:rPr/>
-              <a:t> </a:t>
-            </a:r>
-            <a:r>
-              <a:rPr/>
-              <a:t>to</a:t>
-            </a:r>
-            <a:r>
-              <a:rPr/>
-              <a:t> </a:t>
-            </a:r>
-            <a:r>
-              <a:rPr/>
-              <a:t>percent</a:t>
-            </a:r>
-          </a:p>
-        </p:txBody>
-      </p:sp>
-      <p:sp>
-        <p:nvSpPr>
-          <p:cNvPr id="3" name="Content Placeholder 2"/>
-          <p:cNvSpPr>
-            <a:spLocks noGrp="1"/>
-          </p:cNvSpPr>
-          <p:nvPr>
-            <p:ph idx="1"/>
-          </p:nvPr>
-        </p:nvSpPr>
-        <p:spPr/>
-        <p:txBody>
-          <a:bodyPr/>
-          <a:lstStyle/>
-          <a:p>
-            <a:pPr lvl="0" marL="1270000" indent="0">
-              <a:buNone/>
-            </a:pPr>
-            <a:r>
-              <a:rPr sz="1800">
-                <a:latin typeface="Courier"/>
-              </a:rPr>
-              <a:t> ggplot(mtcars, aes(x = factor(hp))) +  
-        geom_bar(aes(y = (..count..)/sum(..count..))) + 
-        scale_y_continuous(labels = percent) ## version 3.0.0</a:t>
-            </a:r>
-          </a:p>
-          <a:p>
-            <a:pPr lvl="0" marL="0" indent="0">
-              <a:buNone/>
-            </a:pPr>
-            <a:r>
-              <a:rPr/>
-              <a:t>((Show the code in Python, R, and Tableau. Explain why you might want counts versus percents.))</a:t>
-            </a:r>
-          </a:p>
-        </p:txBody>
-      </p:sp>
-    </p:spTree>
-  </p:cSld>
-</p:sld>
-</file>
-
-<file path=ppt/slides/slide56.xml><?xml version="1.0" encoding="utf-8"?>
-<p:sld xmlns:a="http://schemas.openxmlformats.org/drawingml/2006/main" xmlns:r="http://schemas.openxmlformats.org/officeDocument/2006/relationships" xmlns:p="http://schemas.openxmlformats.org/presentationml/2006/main">
-  <p:cSld>
-    <p:spTree>
-      <p:nvGrpSpPr>
-        <p:cNvPr id="1" name=""/>
-        <p:cNvGrpSpPr/>
-        <p:nvPr/>
-      </p:nvGrpSpPr>
-      <p:grpSpPr>
-        <a:xfrm>
-          <a:off x="0" y="0"/>
-          <a:ext cx="0" cy="0"/>
-          <a:chOff x="0" y="0"/>
-          <a:chExt cx="0" cy="0"/>
-        </a:xfrm>
-      </p:grpSpPr>
-      <p:sp>
-        <p:nvSpPr>
-          <p:cNvPr id="2" name="Title 1"/>
-          <p:cNvSpPr>
-            <a:spLocks noGrp="1"/>
-          </p:cNvSpPr>
-          <p:nvPr>
-            <p:ph type="title"/>
-          </p:nvPr>
-        </p:nvSpPr>
-        <p:spPr/>
-        <p:txBody>
-          <a:bodyPr/>
-          <a:lstStyle/>
-          <a:p>
-            <a:pPr lvl="0" marL="0" indent="0">
-              <a:buNone/>
-            </a:pPr>
-            <a:r>
-              <a:rPr/>
-              <a:t>Barchar</a:t>
-            </a:r>
-            <a:r>
-              <a:rPr/>
-              <a:t> </a:t>
-            </a:r>
-            <a:r>
-              <a:rPr/>
-              <a:t>fundamentals,</a:t>
-            </a:r>
-            <a:r>
-              <a:rPr/>
-              <a:t> </a:t>
-            </a:r>
-            <a:r>
-              <a:rPr/>
-              <a:t>Python</a:t>
-            </a:r>
-            <a:r>
-              <a:rPr/>
-              <a:t> </a:t>
-            </a:r>
-            <a:r>
-              <a:rPr/>
-              <a:t>output</a:t>
-            </a:r>
-          </a:p>
-        </p:txBody>
-      </p:sp>
-    </p:spTree>
-  </p:cSld>
-</p:sld>
-</file>
-
-<file path=ppt/slides/slide57.xml><?xml version="1.0" encoding="utf-8"?>
-<p:sld xmlns:a="http://schemas.openxmlformats.org/drawingml/2006/main" xmlns:r="http://schemas.openxmlformats.org/officeDocument/2006/relationships" xmlns:p="http://schemas.openxmlformats.org/presentationml/2006/main">
-  <p:cSld>
-    <p:spTree>
-      <p:nvGrpSpPr>
-        <p:cNvPr id="1" name=""/>
-        <p:cNvGrpSpPr/>
-        <p:nvPr/>
-      </p:nvGrpSpPr>
-      <p:grpSpPr>
-        <a:xfrm>
-          <a:off x="0" y="0"/>
-          <a:ext cx="0" cy="0"/>
-          <a:chOff x="0" y="0"/>
-          <a:chExt cx="0" cy="0"/>
-        </a:xfrm>
-      </p:grpSpPr>
-      <p:sp>
-        <p:nvSpPr>
-          <p:cNvPr id="2" name="Title 1"/>
-          <p:cNvSpPr>
-            <a:spLocks noGrp="1"/>
-          </p:cNvSpPr>
-          <p:nvPr>
-            <p:ph type="title"/>
-          </p:nvPr>
-        </p:nvSpPr>
-        <p:spPr/>
-        <p:txBody>
-          <a:bodyPr/>
-          <a:lstStyle/>
-          <a:p>
-            <a:pPr lvl="0" marL="0" indent="0">
-              <a:buNone/>
-            </a:pPr>
-            <a:r>
-              <a:rPr/>
-              <a:t>Barchart</a:t>
-            </a:r>
-            <a:r>
-              <a:rPr/>
-              <a:t> </a:t>
-            </a:r>
-            <a:r>
-              <a:rPr/>
-              <a:t>fundamentals,</a:t>
-            </a:r>
-            <a:r>
-              <a:rPr/>
-              <a:t> </a:t>
-            </a:r>
-            <a:r>
-              <a:rPr/>
-              <a:t>R</a:t>
-            </a:r>
-            <a:r>
-              <a:rPr/>
-              <a:t> </a:t>
-            </a:r>
-            <a:r>
-              <a:rPr/>
-              <a:t>output</a:t>
+              <a:t>Example</a:t>
+            </a:r>
+            <a:r>
+              <a:rPr/>
+              <a:t> </a:t>
+            </a:r>
+            <a:r>
+              <a:rPr/>
+              <a:t>with</a:t>
+            </a:r>
+            <a:r>
+              <a:rPr/>
+              <a:t> </a:t>
+            </a:r>
+            <a:r>
+              <a:rPr/>
+              <a:t>means</a:t>
             </a:r>
           </a:p>
         </p:txBody>
       </p:sp>
       <p:pic>
         <p:nvPicPr>
-          <p:cNvPr descr="../images/r/mortality-percent.png" id="0" name="Picture 1"/>
+          <p:cNvPr descr="../images/r/mean-barchart.png" id="0" name="Picture 1"/>
           <p:cNvPicPr>
             <a:picLocks noGrp="1" noChangeAspect="1"/>
           </p:cNvPicPr>
@@ -25605,15 +26665,31 @@
             </a:r>
             <a:r>
               <a:rPr/>
-              <a:t>percentage</a:t>
-            </a:r>
-            <a:r>
-              <a:rPr/>
-              <a:t> </a:t>
-            </a:r>
-            <a:r>
-              <a:rPr/>
-              <a:t>survived</a:t>
+              <a:t>mean</a:t>
+            </a:r>
+            <a:r>
+              <a:rPr/>
+              <a:t> </a:t>
+            </a:r>
+            <a:r>
+              <a:rPr/>
+              <a:t>ages</a:t>
+            </a:r>
+            <a:r>
+              <a:rPr/>
+              <a:t> </a:t>
+            </a:r>
+            <a:r>
+              <a:rPr/>
+              <a:t>by</a:t>
+            </a:r>
+            <a:r>
+              <a:rPr/>
+              <a:t> </a:t>
+            </a:r>
+            <a:r>
+              <a:rPr/>
+              <a:t>sex</a:t>
             </a:r>
           </a:p>
         </p:txBody>
@@ -25623,7 +26699,7 @@
 </p:sld>
 </file>
 
-<file path=ppt/slides/slide58.xml><?xml version="1.0" encoding="utf-8"?>
+<file path=ppt/slides/slide56.xml><?xml version="1.0" encoding="utf-8"?>
 <p:sld xmlns:a="http://schemas.openxmlformats.org/drawingml/2006/main" xmlns:r="http://schemas.openxmlformats.org/officeDocument/2006/relationships" xmlns:p="http://schemas.openxmlformats.org/presentationml/2006/main">
   <p:cSld>
     <p:spTree>
@@ -25676,48 +26752,139 @@
             </a:r>
             <a:r>
               <a:rPr/>
-              <a:t>Example</a:t>
-            </a:r>
-            <a:r>
-              <a:rPr/>
-              <a:t> </a:t>
-            </a:r>
-            <a:r>
-              <a:rPr/>
-              <a:t>with</a:t>
-            </a:r>
-            <a:r>
-              <a:rPr/>
-              <a:t> </a:t>
-            </a:r>
-            <a:r>
-              <a:rPr/>
-              <a:t>means</a:t>
+              <a:t>Tableau</a:t>
+            </a:r>
+            <a:r>
+              <a:rPr/>
+              <a:t> </a:t>
+            </a:r>
+            <a:r>
+              <a:rPr/>
+              <a:t>output</a:t>
+            </a:r>
+            <a:r>
+              <a:rPr/>
+              <a:t> </a:t>
+            </a:r>
+            <a:r>
+              <a:rPr/>
+              <a:t>of</a:t>
+            </a:r>
+            <a:r>
+              <a:rPr/>
+              <a:t> </a:t>
+            </a:r>
+            <a:r>
+              <a:rPr/>
+              <a:t>mean</a:t>
+            </a:r>
+            <a:r>
+              <a:rPr/>
+              <a:t> </a:t>
+            </a:r>
+            <a:r>
+              <a:rPr/>
+              <a:t>barchart</a:t>
             </a:r>
           </a:p>
         </p:txBody>
       </p:sp>
+      <p:pic>
+        <p:nvPicPr>
+          <p:cNvPr descr="../images/tableau/mean-barchart.png" id="0" name="Picture 1"/>
+          <p:cNvPicPr>
+            <a:picLocks noGrp="1" noChangeAspect="1"/>
+          </p:cNvPicPr>
+          <p:nvPr/>
+        </p:nvPicPr>
+        <p:blipFill>
+          <a:blip r:embed="rId2"/>
+          <a:stretch>
+            <a:fillRect/>
+          </a:stretch>
+        </p:blipFill>
+        <p:spPr bwMode="auto">
+          <a:xfrm>
+            <a:off x="558800" y="1600200"/>
+            <a:ext cx="8026400" cy="4013200"/>
+          </a:xfrm>
+          <a:prstGeom prst="rect">
+            <a:avLst/>
+          </a:prstGeom>
+          <a:noFill/>
+          <a:ln w="9525">
+            <a:noFill/>
+            <a:headEnd/>
+            <a:tailEnd/>
+          </a:ln>
+        </p:spPr>
+      </p:pic>
       <p:sp>
         <p:nvSpPr>
-          <p:cNvPr id="3" name="Content Placeholder 2"/>
-          <p:cNvSpPr>
-            <a:spLocks noGrp="1"/>
-          </p:cNvSpPr>
-          <p:nvPr>
-            <p:ph idx="1"/>
-          </p:nvPr>
+          <p:cNvPr id="1" name="TextBox 3"/>
+          <p:cNvSpPr txBox="1"/>
+          <p:nvPr/>
         </p:nvSpPr>
-        <p:spPr/>
+        <p:spPr>
+          <a:xfrm>
+            <a:off x="457200" y="5613400"/>
+            <a:ext cx="8229600" cy="508000"/>
+          </a:xfrm>
+          <a:prstGeom prst="rect">
+            <a:avLst/>
+          </a:prstGeom>
+          <a:noFill/>
+        </p:spPr>
         <p:txBody>
           <a:bodyPr/>
           <a:lstStyle/>
           <a:p>
-            <a:pPr lvl="0" marL="0" indent="0">
+            <a:pPr lvl="0" marL="0" indent="0" algn="ctr">
               <a:buNone/>
             </a:pPr>
             <a:r>
               <a:rPr/>
-              <a:t>((Need to find the right data set to illustrate this. Maybe the Saratoga house prices?))</a:t>
+              <a:t>Barchart</a:t>
+            </a:r>
+            <a:r>
+              <a:rPr/>
+              <a:t> </a:t>
+            </a:r>
+            <a:r>
+              <a:rPr/>
+              <a:t>of</a:t>
+            </a:r>
+            <a:r>
+              <a:rPr/>
+              <a:t> </a:t>
+            </a:r>
+            <a:r>
+              <a:rPr/>
+              <a:t>mean</a:t>
+            </a:r>
+            <a:r>
+              <a:rPr/>
+              <a:t> </a:t>
+            </a:r>
+            <a:r>
+              <a:rPr/>
+              <a:t>ages</a:t>
+            </a:r>
+            <a:r>
+              <a:rPr/>
+              <a:t> </a:t>
+            </a:r>
+            <a:r>
+              <a:rPr/>
+              <a:t>by</a:t>
+            </a:r>
+            <a:r>
+              <a:rPr/>
+              <a:t> </a:t>
+            </a:r>
+            <a:r>
+              <a:rPr/>
+              <a:t>sex</a:t>
             </a:r>
           </a:p>
         </p:txBody>
@@ -25727,7 +26894,7 @@
 </p:sld>
 </file>
 
-<file path=ppt/slides/slide59.xml><?xml version="1.0" encoding="utf-8"?>
+<file path=ppt/slides/slide57.xml><?xml version="1.0" encoding="utf-8"?>
 <p:sld xmlns:a="http://schemas.openxmlformats.org/drawingml/2006/main" xmlns:r="http://schemas.openxmlformats.org/officeDocument/2006/relationships" xmlns:p="http://schemas.openxmlformats.org/presentationml/2006/main">
   <p:cSld>
     <p:spTree>
@@ -25780,23 +26947,7 @@
             </a:r>
             <a:r>
               <a:rPr/>
-              <a:t>Example</a:t>
-            </a:r>
-            <a:r>
-              <a:rPr/>
-              <a:t> </a:t>
-            </a:r>
-            <a:r>
-              <a:rPr/>
-              <a:t>with</a:t>
-            </a:r>
-            <a:r>
-              <a:rPr/>
-              <a:t> </a:t>
-            </a:r>
-            <a:r>
-              <a:rPr/>
-              <a:t>totals</a:t>
+              <a:t>Summary</a:t>
             </a:r>
           </a:p>
         </p:txBody>
@@ -25816,12 +26967,31 @@
           <a:bodyPr/>
           <a:lstStyle/>
           <a:p>
-            <a:pPr lvl="0" marL="0" indent="0">
-              <a:buNone/>
-            </a:pPr>
-            <a:r>
-              <a:rPr/>
-              <a:t>((Same data. What means tell you versus totals.))</a:t>
+            <a:pPr lvl="1"/>
+            <a:r>
+              <a:rPr/>
+              <a:t>“A mapping of data to the visual aesthetics of geometries/marks”</a:t>
+            </a:r>
+          </a:p>
+          <a:p>
+            <a:pPr lvl="2"/>
+            <a:r>
+              <a:rPr/>
+              <a:t>Bars are a type of geometry/mark</a:t>
+            </a:r>
+          </a:p>
+          <a:p>
+            <a:pPr lvl="2"/>
+            <a:r>
+              <a:rPr/>
+              <a:t>Aesthetics for bars include location, size, color</a:t>
+            </a:r>
+          </a:p>
+          <a:p>
+            <a:pPr lvl="2"/>
+            <a:r>
+              <a:rPr/>
+              <a:t>Stack versus dodge versus normalize</a:t>
             </a:r>
           </a:p>
         </p:txBody>
@@ -25951,422 +27121,6 @@
           </a:ln>
         </p:spPr>
       </p:pic>
-    </p:spTree>
-  </p:cSld>
-</p:sld>
-</file>
-
-<file path=ppt/slides/slide60.xml><?xml version="1.0" encoding="utf-8"?>
-<p:sld xmlns:a="http://schemas.openxmlformats.org/drawingml/2006/main" xmlns:r="http://schemas.openxmlformats.org/officeDocument/2006/relationships" xmlns:p="http://schemas.openxmlformats.org/presentationml/2006/main">
-  <p:cSld>
-    <p:spTree>
-      <p:nvGrpSpPr>
-        <p:cNvPr id="1" name=""/>
-        <p:cNvGrpSpPr/>
-        <p:nvPr/>
-      </p:nvGrpSpPr>
-      <p:grpSpPr>
-        <a:xfrm>
-          <a:off x="0" y="0"/>
-          <a:ext cx="0" cy="0"/>
-          <a:chOff x="0" y="0"/>
-          <a:chExt cx="0" cy="0"/>
-        </a:xfrm>
-      </p:grpSpPr>
-      <p:sp>
-        <p:nvSpPr>
-          <p:cNvPr id="2" name="Title 1"/>
-          <p:cNvSpPr>
-            <a:spLocks noGrp="1"/>
-          </p:cNvSpPr>
-          <p:nvPr>
-            <p:ph type="title"/>
-          </p:nvPr>
-        </p:nvSpPr>
-        <p:spPr/>
-        <p:txBody>
-          <a:bodyPr/>
-          <a:lstStyle/>
-          <a:p>
-            <a:pPr lvl="0" marL="0" indent="0">
-              <a:buNone/>
-            </a:pPr>
-            <a:r>
-              <a:rPr/>
-              <a:t>Barchart</a:t>
-            </a:r>
-            <a:r>
-              <a:rPr/>
-              <a:t> </a:t>
-            </a:r>
-            <a:r>
-              <a:rPr/>
-              <a:t>fundamentals,</a:t>
-            </a:r>
-            <a:r>
-              <a:rPr/>
-              <a:t> </a:t>
-            </a:r>
-            <a:r>
-              <a:rPr/>
-              <a:t>Boxplots</a:t>
-            </a:r>
-            <a:r>
-              <a:rPr/>
-              <a:t> </a:t>
-            </a:r>
-            <a:r>
-              <a:rPr/>
-              <a:t>example</a:t>
-            </a:r>
-          </a:p>
-        </p:txBody>
-      </p:sp>
-      <p:sp>
-        <p:nvSpPr>
-          <p:cNvPr id="3" name="Content Placeholder 2"/>
-          <p:cNvSpPr>
-            <a:spLocks noGrp="1"/>
-          </p:cNvSpPr>
-          <p:nvPr>
-            <p:ph idx="1"/>
-          </p:nvPr>
-        </p:nvSpPr>
-        <p:spPr/>
-        <p:txBody>
-          <a:bodyPr/>
-          <a:lstStyle/>
-          <a:p>
-            <a:pPr lvl="0" marL="0" indent="0">
-              <a:buNone/>
-            </a:pPr>
-            <a:r>
-              <a:rPr/>
-              <a:t>((Include an explanation of what a boxplot is))</a:t>
-            </a:r>
-          </a:p>
-        </p:txBody>
-      </p:sp>
-    </p:spTree>
-  </p:cSld>
-</p:sld>
-</file>
-
-<file path=ppt/slides/slide61.xml><?xml version="1.0" encoding="utf-8"?>
-<p:sld xmlns:a="http://schemas.openxmlformats.org/drawingml/2006/main" xmlns:r="http://schemas.openxmlformats.org/officeDocument/2006/relationships" xmlns:p="http://schemas.openxmlformats.org/presentationml/2006/main">
-  <p:cSld>
-    <p:spTree>
-      <p:nvGrpSpPr>
-        <p:cNvPr id="1" name=""/>
-        <p:cNvGrpSpPr/>
-        <p:nvPr/>
-      </p:nvGrpSpPr>
-      <p:grpSpPr>
-        <a:xfrm>
-          <a:off x="0" y="0"/>
-          <a:ext cx="0" cy="0"/>
-          <a:chOff x="0" y="0"/>
-          <a:chExt cx="0" cy="0"/>
-        </a:xfrm>
-      </p:grpSpPr>
-      <p:sp>
-        <p:nvSpPr>
-          <p:cNvPr id="2" name="Title 1"/>
-          <p:cNvSpPr>
-            <a:spLocks noGrp="1"/>
-          </p:cNvSpPr>
-          <p:nvPr>
-            <p:ph type="title"/>
-          </p:nvPr>
-        </p:nvSpPr>
-        <p:spPr/>
-        <p:txBody>
-          <a:bodyPr/>
-          <a:lstStyle/>
-          <a:p>
-            <a:pPr lvl="0" marL="0" indent="0">
-              <a:buNone/>
-            </a:pPr>
-            <a:r>
-              <a:rPr/>
-              <a:t>Barchart</a:t>
-            </a:r>
-            <a:r>
-              <a:rPr/>
-              <a:t> </a:t>
-            </a:r>
-            <a:r>
-              <a:rPr/>
-              <a:t>fundamentals,</a:t>
-            </a:r>
-            <a:r>
-              <a:rPr/>
-              <a:t> </a:t>
-            </a:r>
-            <a:r>
-              <a:rPr/>
-              <a:t>Jittering</a:t>
-            </a:r>
-            <a:r>
-              <a:rPr/>
-              <a:t> </a:t>
-            </a:r>
-            <a:r>
-              <a:rPr/>
-              <a:t>example</a:t>
-            </a:r>
-          </a:p>
-        </p:txBody>
-      </p:sp>
-      <p:sp>
-        <p:nvSpPr>
-          <p:cNvPr id="3" name="Content Placeholder 2"/>
-          <p:cNvSpPr>
-            <a:spLocks noGrp="1"/>
-          </p:cNvSpPr>
-          <p:nvPr>
-            <p:ph idx="1"/>
-          </p:nvPr>
-        </p:nvSpPr>
-        <p:spPr/>
-        <p:txBody>
-          <a:bodyPr/>
-          <a:lstStyle/>
-          <a:p>
-            <a:pPr lvl="0" marL="0" indent="0">
-              <a:buNone/>
-            </a:pPr>
-            <a:r>
-              <a:rPr/>
-              <a:t>((Include an explanation on when it doesn’t work.))</a:t>
-            </a:r>
-          </a:p>
-        </p:txBody>
-      </p:sp>
-    </p:spTree>
-  </p:cSld>
-</p:sld>
-</file>
-
-<file path=ppt/slides/slide62.xml><?xml version="1.0" encoding="utf-8"?>
-<p:sld xmlns:a="http://schemas.openxmlformats.org/drawingml/2006/main" xmlns:r="http://schemas.openxmlformats.org/officeDocument/2006/relationships" xmlns:p="http://schemas.openxmlformats.org/presentationml/2006/main">
-  <p:cSld>
-    <p:spTree>
-      <p:nvGrpSpPr>
-        <p:cNvPr id="1" name=""/>
-        <p:cNvGrpSpPr/>
-        <p:nvPr/>
-      </p:nvGrpSpPr>
-      <p:grpSpPr>
-        <a:xfrm>
-          <a:off x="0" y="0"/>
-          <a:ext cx="0" cy="0"/>
-          <a:chOff x="0" y="0"/>
-          <a:chExt cx="0" cy="0"/>
-        </a:xfrm>
-      </p:grpSpPr>
-      <p:sp>
-        <p:nvSpPr>
-          <p:cNvPr id="2" name="Title 1"/>
-          <p:cNvSpPr>
-            <a:spLocks noGrp="1"/>
-          </p:cNvSpPr>
-          <p:nvPr>
-            <p:ph type="title"/>
-          </p:nvPr>
-        </p:nvSpPr>
-        <p:spPr/>
-        <p:txBody>
-          <a:bodyPr/>
-          <a:lstStyle/>
-          <a:p>
-            <a:pPr lvl="0" marL="0" indent="0">
-              <a:buNone/>
-            </a:pPr>
-            <a:r>
-              <a:rPr/>
-              <a:t>Barchart</a:t>
-            </a:r>
-            <a:r>
-              <a:rPr/>
-              <a:t> </a:t>
-            </a:r>
-            <a:r>
-              <a:rPr/>
-              <a:t>fundamentals,</a:t>
-            </a:r>
-            <a:r>
-              <a:rPr/>
-              <a:t> </a:t>
-            </a:r>
-            <a:r>
-              <a:rPr/>
-              <a:t>Opacity</a:t>
-            </a:r>
-            <a:r>
-              <a:rPr/>
-              <a:t> </a:t>
-            </a:r>
-            <a:r>
-              <a:rPr/>
-              <a:t>example</a:t>
-            </a:r>
-          </a:p>
-        </p:txBody>
-      </p:sp>
-      <p:sp>
-        <p:nvSpPr>
-          <p:cNvPr id="3" name="Content Placeholder 2"/>
-          <p:cNvSpPr>
-            <a:spLocks noGrp="1"/>
-          </p:cNvSpPr>
-          <p:nvPr>
-            <p:ph idx="1"/>
-          </p:nvPr>
-        </p:nvSpPr>
-        <p:spPr/>
-        <p:txBody>
-          <a:bodyPr/>
-          <a:lstStyle/>
-          <a:p>
-            <a:pPr lvl="0" marL="0" indent="0">
-              <a:buNone/>
-            </a:pPr>
-            <a:r>
-              <a:rPr/>
-              <a:t>((Note the computational expense.))</a:t>
-            </a:r>
-          </a:p>
-        </p:txBody>
-      </p:sp>
-    </p:spTree>
-  </p:cSld>
-</p:sld>
-</file>
-
-<file path=ppt/slides/slide63.xml><?xml version="1.0" encoding="utf-8"?>
-<p:sld xmlns:a="http://schemas.openxmlformats.org/drawingml/2006/main" xmlns:r="http://schemas.openxmlformats.org/officeDocument/2006/relationships" xmlns:p="http://schemas.openxmlformats.org/presentationml/2006/main">
-  <p:cSld>
-    <p:spTree>
-      <p:nvGrpSpPr>
-        <p:cNvPr id="1" name=""/>
-        <p:cNvGrpSpPr/>
-        <p:nvPr/>
-      </p:nvGrpSpPr>
-      <p:grpSpPr>
-        <a:xfrm>
-          <a:off x="0" y="0"/>
-          <a:ext cx="0" cy="0"/>
-          <a:chOff x="0" y="0"/>
-          <a:chExt cx="0" cy="0"/>
-        </a:xfrm>
-      </p:grpSpPr>
-      <p:sp>
-        <p:nvSpPr>
-          <p:cNvPr id="2" name="Title 1"/>
-          <p:cNvSpPr>
-            <a:spLocks noGrp="1"/>
-          </p:cNvSpPr>
-          <p:nvPr>
-            <p:ph type="title"/>
-          </p:nvPr>
-        </p:nvSpPr>
-        <p:spPr/>
-        <p:txBody>
-          <a:bodyPr/>
-          <a:lstStyle/>
-          <a:p>
-            <a:pPr lvl="0" marL="0" indent="0">
-              <a:buNone/>
-            </a:pPr>
-            <a:r>
-              <a:rPr/>
-              <a:t>Barchart</a:t>
-            </a:r>
-            <a:r>
-              <a:rPr/>
-              <a:t> </a:t>
-            </a:r>
-            <a:r>
-              <a:rPr/>
-              <a:t>fundamentals,</a:t>
-            </a:r>
-            <a:r>
-              <a:rPr/>
-              <a:t> </a:t>
-            </a:r>
-            <a:r>
-              <a:rPr/>
-              <a:t>Summary</a:t>
-            </a:r>
-          </a:p>
-        </p:txBody>
-      </p:sp>
-      <p:sp>
-        <p:nvSpPr>
-          <p:cNvPr id="3" name="Content Placeholder 2"/>
-          <p:cNvSpPr>
-            <a:spLocks noGrp="1"/>
-          </p:cNvSpPr>
-          <p:nvPr>
-            <p:ph idx="1"/>
-          </p:nvPr>
-        </p:nvSpPr>
-        <p:spPr/>
-        <p:txBody>
-          <a:bodyPr/>
-          <a:lstStyle/>
-          <a:p>
-            <a:pPr lvl="1"/>
-            <a:r>
-              <a:rPr/>
-              <a:t>“A mapping of data to the visual aesthetics of geometries/marks”</a:t>
-            </a:r>
-          </a:p>
-          <a:p>
-            <a:pPr lvl="2"/>
-            <a:r>
-              <a:rPr/>
-              <a:t>Bars are a type of geometry/mark</a:t>
-            </a:r>
-          </a:p>
-          <a:p>
-            <a:pPr lvl="2"/>
-            <a:r>
-              <a:rPr/>
-              <a:t>Aesthetics for bars include location, size, color</a:t>
-            </a:r>
-          </a:p>
-          <a:p>
-            <a:pPr lvl="2"/>
-            <a:r>
-              <a:rPr/>
-              <a:t>Stack versus dodge</a:t>
-            </a:r>
-          </a:p>
-          <a:p>
-            <a:pPr lvl="1"/>
-            <a:r>
-              <a:rPr/>
-              <a:t>Basic tips</a:t>
-            </a:r>
-          </a:p>
-          <a:p>
-            <a:pPr lvl="2"/>
-            <a:r>
-              <a:rPr/>
-              <a:t>Place comparators close</a:t>
-            </a:r>
-          </a:p>
-          <a:p>
-            <a:pPr lvl="2"/>
-            <a:r>
-              <a:rPr/>
-              <a:t>Use axis ticks, light grid lines</a:t>
-            </a:r>
-          </a:p>
-        </p:txBody>
-      </p:sp>
     </p:spTree>
   </p:cSld>
 </p:sld>

</xml_diff>